<commit_message>
Jake Part added to powerpoint
</commit_message>
<xml_diff>
--- a/Poster/Group59Poster.pptx
+++ b/Poster/Group59Poster.pptx
@@ -238,7 +238,7 @@
           <a:p>
             <a:fld id="{7395F848-6DDA-9042-95D4-0071278BB24B}" type="datetimeFigureOut">
               <a:rPr lang="en-US" smtClean="0"/>
-              <a:t>3/14/2017</a:t>
+              <a:t>4/13/2017</a:t>
             </a:fld>
             <a:endParaRPr lang="en-US"/>
           </a:p>
@@ -302,38 +302,37 @@
           <a:p>
             <a:pPr lvl="0"/>
             <a:r>
-              <a:rPr lang="en-US" smtClean="0"/>
+              <a:rPr lang="en-US"/>
               <a:t>Click to edit Master text styles</a:t>
             </a:r>
           </a:p>
           <a:p>
             <a:pPr lvl="1"/>
             <a:r>
-              <a:rPr lang="en-US" smtClean="0"/>
+              <a:rPr lang="en-US"/>
               <a:t>Second level</a:t>
             </a:r>
           </a:p>
           <a:p>
             <a:pPr lvl="2"/>
             <a:r>
-              <a:rPr lang="en-US" smtClean="0"/>
+              <a:rPr lang="en-US"/>
               <a:t>Third level</a:t>
             </a:r>
           </a:p>
           <a:p>
             <a:pPr lvl="3"/>
             <a:r>
-              <a:rPr lang="en-US" smtClean="0"/>
+              <a:rPr lang="en-US"/>
               <a:t>Fourth level</a:t>
             </a:r>
           </a:p>
           <a:p>
             <a:pPr lvl="4"/>
             <a:r>
-              <a:rPr lang="en-US" smtClean="0"/>
+              <a:rPr lang="en-US"/>
               <a:t>Fifth level</a:t>
             </a:r>
-            <a:endParaRPr lang="en-US"/>
           </a:p>
         </p:txBody>
       </p:sp>
@@ -568,26 +567,26 @@
               <a:defRPr/>
             </a:pPr>
             <a:r>
-              <a:rPr lang="en-US" dirty="0" smtClean="0"/>
+              <a:rPr lang="en-US" dirty="0"/>
               <a:t>If tri-fold</a:t>
             </a:r>
             <a:r>
-              <a:rPr lang="en-US" baseline="0" dirty="0" smtClean="0"/>
+              <a:rPr lang="en-US" baseline="0" dirty="0"/>
               <a:t> mounting at SMS – make sure no text or image is in-between</a:t>
             </a:r>
             <a:r>
-              <a:rPr lang="en-US" dirty="0" smtClean="0"/>
+              <a:rPr lang="en-US" dirty="0"/>
               <a:t> the two vertical guide</a:t>
             </a:r>
             <a:r>
-              <a:rPr lang="en-US" baseline="0" dirty="0" smtClean="0"/>
+              <a:rPr lang="en-US" baseline="0" dirty="0"/>
               <a:t> lines; this space will be cut away. </a:t>
             </a:r>
             <a:r>
-              <a:rPr lang="en-US" baseline="0" smtClean="0"/>
+              <a:rPr lang="en-US" baseline="0"/>
               <a:t>To view the vertical guide lines: Select “View” from the main menu, select “Guides” from the pull down menu, and lastly select “Static Guides”.</a:t>
             </a:r>
-            <a:endParaRPr lang="en-US" smtClean="0"/>
+            <a:endParaRPr lang="en-US"/>
           </a:p>
           <a:p>
             <a:pPr marL="0" marR="0" indent="0" algn="l" defTabSz="457200" rtl="0" eaLnBrk="1" fontAlgn="auto" latinLnBrk="0" hangingPunct="1">
@@ -607,7 +606,7 @@
               <a:tabLst/>
               <a:defRPr/>
             </a:pPr>
-            <a:endParaRPr lang="en-US" smtClean="0"/>
+            <a:endParaRPr lang="en-US"/>
           </a:p>
           <a:p>
             <a:endParaRPr lang="en-US" dirty="0"/>
@@ -1005,14 +1004,14 @@
               </a:spcAft>
             </a:pPr>
             <a:r>
-              <a:rPr lang="en-US" sz="4000" b="1" dirty="0" smtClean="0">
+              <a:rPr lang="en-US" sz="4000" b="1" dirty="0">
                 <a:solidFill>
                   <a:schemeClr val="bg1"/>
                 </a:solidFill>
               </a:rPr>
               <a:t>COLLEGE OF ENGINEERING</a:t>
             </a:r>
-            <a:endParaRPr lang="en-US" sz="4000" dirty="0" smtClean="0">
+            <a:endParaRPr lang="en-US" sz="4000" dirty="0">
               <a:solidFill>
                 <a:schemeClr val="bg1"/>
               </a:solidFill>
@@ -1138,16 +1137,12 @@
               </a:spcAft>
             </a:pPr>
             <a:r>
-              <a:rPr lang="en-US" sz="4000" b="1" dirty="0" smtClean="0">
+              <a:rPr lang="en-US" sz="4000" b="1" dirty="0">
                 <a:latin typeface="Georgia"/>
                 <a:cs typeface="Georgia"/>
               </a:rPr>
               <a:t>Electrical Engineering &amp; Computer Science</a:t>
             </a:r>
-            <a:endParaRPr lang="en-US" sz="4000" b="1" dirty="0">
-              <a:latin typeface="Georgia"/>
-              <a:cs typeface="Georgia"/>
-            </a:endParaRPr>
           </a:p>
         </p:txBody>
       </p:sp>
@@ -1317,10 +1312,9 @@
           <a:lstStyle/>
           <a:p>
             <a:r>
-              <a:rPr lang="en-US" smtClean="0"/>
+              <a:rPr lang="en-US"/>
               <a:t>Click to edit Master title style</a:t>
             </a:r>
-            <a:endParaRPr lang="en-US"/>
           </a:p>
         </p:txBody>
       </p:sp>
@@ -1341,38 +1335,37 @@
           <a:p>
             <a:pPr lvl="0"/>
             <a:r>
-              <a:rPr lang="en-US" smtClean="0"/>
+              <a:rPr lang="en-US"/>
               <a:t>Edit Master text styles</a:t>
             </a:r>
           </a:p>
           <a:p>
             <a:pPr lvl="1"/>
             <a:r>
-              <a:rPr lang="en-US" smtClean="0"/>
+              <a:rPr lang="en-US"/>
               <a:t>Second level</a:t>
             </a:r>
           </a:p>
           <a:p>
             <a:pPr lvl="2"/>
             <a:r>
-              <a:rPr lang="en-US" smtClean="0"/>
+              <a:rPr lang="en-US"/>
               <a:t>Third level</a:t>
             </a:r>
           </a:p>
           <a:p>
             <a:pPr lvl="3"/>
             <a:r>
-              <a:rPr lang="en-US" smtClean="0"/>
+              <a:rPr lang="en-US"/>
               <a:t>Fourth level</a:t>
             </a:r>
           </a:p>
           <a:p>
             <a:pPr lvl="4"/>
             <a:r>
-              <a:rPr lang="en-US" smtClean="0"/>
+              <a:rPr lang="en-US"/>
               <a:t>Fifth level</a:t>
             </a:r>
-            <a:endParaRPr lang="en-US"/>
           </a:p>
         </p:txBody>
       </p:sp>
@@ -1393,7 +1386,7 @@
           <a:p>
             <a:fld id="{56B6BD69-149A-CD41-9E7C-E241C9398BA0}" type="datetimeFigureOut">
               <a:rPr lang="en-US" smtClean="0"/>
-              <a:t>3/14/2017</a:t>
+              <a:t>4/13/2017</a:t>
             </a:fld>
             <a:endParaRPr lang="en-US"/>
           </a:p>
@@ -1492,10 +1485,9 @@
           <a:lstStyle/>
           <a:p>
             <a:r>
-              <a:rPr lang="en-US" smtClean="0"/>
+              <a:rPr lang="en-US"/>
               <a:t>Click to edit Master title style</a:t>
             </a:r>
-            <a:endParaRPr lang="en-US"/>
           </a:p>
         </p:txBody>
       </p:sp>
@@ -1521,38 +1513,37 @@
           <a:p>
             <a:pPr lvl="0"/>
             <a:r>
-              <a:rPr lang="en-US" smtClean="0"/>
+              <a:rPr lang="en-US"/>
               <a:t>Edit Master text styles</a:t>
             </a:r>
           </a:p>
           <a:p>
             <a:pPr lvl="1"/>
             <a:r>
-              <a:rPr lang="en-US" smtClean="0"/>
+              <a:rPr lang="en-US"/>
               <a:t>Second level</a:t>
             </a:r>
           </a:p>
           <a:p>
             <a:pPr lvl="2"/>
             <a:r>
-              <a:rPr lang="en-US" smtClean="0"/>
+              <a:rPr lang="en-US"/>
               <a:t>Third level</a:t>
             </a:r>
           </a:p>
           <a:p>
             <a:pPr lvl="3"/>
             <a:r>
-              <a:rPr lang="en-US" smtClean="0"/>
+              <a:rPr lang="en-US"/>
               <a:t>Fourth level</a:t>
             </a:r>
           </a:p>
           <a:p>
             <a:pPr lvl="4"/>
             <a:r>
-              <a:rPr lang="en-US" smtClean="0"/>
+              <a:rPr lang="en-US"/>
               <a:t>Fifth level</a:t>
             </a:r>
-            <a:endParaRPr lang="en-US"/>
           </a:p>
         </p:txBody>
       </p:sp>
@@ -1573,7 +1564,7 @@
           <a:p>
             <a:fld id="{56B6BD69-149A-CD41-9E7C-E241C9398BA0}" type="datetimeFigureOut">
               <a:rPr lang="en-US" smtClean="0"/>
-              <a:t>3/14/2017</a:t>
+              <a:t>4/13/2017</a:t>
             </a:fld>
             <a:endParaRPr lang="en-US"/>
           </a:p>
@@ -1667,10 +1658,9 @@
           <a:lstStyle/>
           <a:p>
             <a:r>
-              <a:rPr lang="en-US" smtClean="0"/>
+              <a:rPr lang="en-US"/>
               <a:t>Click to edit Master title style</a:t>
             </a:r>
-            <a:endParaRPr lang="en-US"/>
           </a:p>
         </p:txBody>
       </p:sp>
@@ -1691,38 +1681,37 @@
           <a:p>
             <a:pPr lvl="0"/>
             <a:r>
-              <a:rPr lang="en-US" smtClean="0"/>
+              <a:rPr lang="en-US"/>
               <a:t>Edit Master text styles</a:t>
             </a:r>
           </a:p>
           <a:p>
             <a:pPr lvl="1"/>
             <a:r>
-              <a:rPr lang="en-US" smtClean="0"/>
+              <a:rPr lang="en-US"/>
               <a:t>Second level</a:t>
             </a:r>
           </a:p>
           <a:p>
             <a:pPr lvl="2"/>
             <a:r>
-              <a:rPr lang="en-US" smtClean="0"/>
+              <a:rPr lang="en-US"/>
               <a:t>Third level</a:t>
             </a:r>
           </a:p>
           <a:p>
             <a:pPr lvl="3"/>
             <a:r>
-              <a:rPr lang="en-US" smtClean="0"/>
+              <a:rPr lang="en-US"/>
               <a:t>Fourth level</a:t>
             </a:r>
           </a:p>
           <a:p>
             <a:pPr lvl="4"/>
             <a:r>
-              <a:rPr lang="en-US" smtClean="0"/>
+              <a:rPr lang="en-US"/>
               <a:t>Fifth level</a:t>
             </a:r>
-            <a:endParaRPr lang="en-US"/>
           </a:p>
         </p:txBody>
       </p:sp>
@@ -1743,7 +1732,7 @@
           <a:p>
             <a:fld id="{56B6BD69-149A-CD41-9E7C-E241C9398BA0}" type="datetimeFigureOut">
               <a:rPr lang="en-US" smtClean="0"/>
-              <a:t>3/14/2017</a:t>
+              <a:t>4/13/2017</a:t>
             </a:fld>
             <a:endParaRPr lang="en-US"/>
           </a:p>
@@ -1846,10 +1835,9 @@
           </a:lstStyle>
           <a:p>
             <a:r>
-              <a:rPr lang="en-US" smtClean="0"/>
+              <a:rPr lang="en-US"/>
               <a:t>Click to edit Master title style</a:t>
             </a:r>
-            <a:endParaRPr lang="en-US"/>
           </a:p>
         </p:txBody>
       </p:sp>
@@ -1966,7 +1954,7 @@
           <a:p>
             <a:pPr lvl="0"/>
             <a:r>
-              <a:rPr lang="en-US" smtClean="0"/>
+              <a:rPr lang="en-US"/>
               <a:t>Edit Master text styles</a:t>
             </a:r>
           </a:p>
@@ -1989,7 +1977,7 @@
           <a:p>
             <a:fld id="{56B6BD69-149A-CD41-9E7C-E241C9398BA0}" type="datetimeFigureOut">
               <a:rPr lang="en-US" smtClean="0"/>
-              <a:t>3/14/2017</a:t>
+              <a:t>4/13/2017</a:t>
             </a:fld>
             <a:endParaRPr lang="en-US"/>
           </a:p>
@@ -2083,10 +2071,9 @@
           <a:lstStyle/>
           <a:p>
             <a:r>
-              <a:rPr lang="en-US" smtClean="0"/>
+              <a:rPr lang="en-US"/>
               <a:t>Click to edit Master title style</a:t>
             </a:r>
-            <a:endParaRPr lang="en-US"/>
           </a:p>
         </p:txBody>
       </p:sp>
@@ -2140,38 +2127,37 @@
           <a:p>
             <a:pPr lvl="0"/>
             <a:r>
-              <a:rPr lang="en-US" smtClean="0"/>
+              <a:rPr lang="en-US"/>
               <a:t>Edit Master text styles</a:t>
             </a:r>
           </a:p>
           <a:p>
             <a:pPr lvl="1"/>
             <a:r>
-              <a:rPr lang="en-US" smtClean="0"/>
+              <a:rPr lang="en-US"/>
               <a:t>Second level</a:t>
             </a:r>
           </a:p>
           <a:p>
             <a:pPr lvl="2"/>
             <a:r>
-              <a:rPr lang="en-US" smtClean="0"/>
+              <a:rPr lang="en-US"/>
               <a:t>Third level</a:t>
             </a:r>
           </a:p>
           <a:p>
             <a:pPr lvl="3"/>
             <a:r>
-              <a:rPr lang="en-US" smtClean="0"/>
+              <a:rPr lang="en-US"/>
               <a:t>Fourth level</a:t>
             </a:r>
           </a:p>
           <a:p>
             <a:pPr lvl="4"/>
             <a:r>
-              <a:rPr lang="en-US" smtClean="0"/>
+              <a:rPr lang="en-US"/>
               <a:t>Fifth level</a:t>
             </a:r>
-            <a:endParaRPr lang="en-US"/>
           </a:p>
         </p:txBody>
       </p:sp>
@@ -2225,38 +2211,37 @@
           <a:p>
             <a:pPr lvl="0"/>
             <a:r>
-              <a:rPr lang="en-US" smtClean="0"/>
+              <a:rPr lang="en-US"/>
               <a:t>Edit Master text styles</a:t>
             </a:r>
           </a:p>
           <a:p>
             <a:pPr lvl="1"/>
             <a:r>
-              <a:rPr lang="en-US" smtClean="0"/>
+              <a:rPr lang="en-US"/>
               <a:t>Second level</a:t>
             </a:r>
           </a:p>
           <a:p>
             <a:pPr lvl="2"/>
             <a:r>
-              <a:rPr lang="en-US" smtClean="0"/>
+              <a:rPr lang="en-US"/>
               <a:t>Third level</a:t>
             </a:r>
           </a:p>
           <a:p>
             <a:pPr lvl="3"/>
             <a:r>
-              <a:rPr lang="en-US" smtClean="0"/>
+              <a:rPr lang="en-US"/>
               <a:t>Fourth level</a:t>
             </a:r>
           </a:p>
           <a:p>
             <a:pPr lvl="4"/>
             <a:r>
-              <a:rPr lang="en-US" smtClean="0"/>
+              <a:rPr lang="en-US"/>
               <a:t>Fifth level</a:t>
             </a:r>
-            <a:endParaRPr lang="en-US"/>
           </a:p>
         </p:txBody>
       </p:sp>
@@ -2277,7 +2262,7 @@
           <a:p>
             <a:fld id="{56B6BD69-149A-CD41-9E7C-E241C9398BA0}" type="datetimeFigureOut">
               <a:rPr lang="en-US" smtClean="0"/>
-              <a:t>3/14/2017</a:t>
+              <a:t>4/13/2017</a:t>
             </a:fld>
             <a:endParaRPr lang="en-US"/>
           </a:p>
@@ -2380,10 +2365,9 @@
           </a:lstStyle>
           <a:p>
             <a:r>
-              <a:rPr lang="en-US" smtClean="0"/>
+              <a:rPr lang="en-US"/>
               <a:t>Click to edit Master title style</a:t>
             </a:r>
-            <a:endParaRPr lang="en-US"/>
           </a:p>
         </p:txBody>
       </p:sp>
@@ -2446,7 +2430,7 @@
           <a:p>
             <a:pPr lvl="0"/>
             <a:r>
-              <a:rPr lang="en-US" smtClean="0"/>
+              <a:rPr lang="en-US"/>
               <a:t>Edit Master text styles</a:t>
             </a:r>
           </a:p>
@@ -2502,38 +2486,37 @@
           <a:p>
             <a:pPr lvl="0"/>
             <a:r>
-              <a:rPr lang="en-US" smtClean="0"/>
+              <a:rPr lang="en-US"/>
               <a:t>Edit Master text styles</a:t>
             </a:r>
           </a:p>
           <a:p>
             <a:pPr lvl="1"/>
             <a:r>
-              <a:rPr lang="en-US" smtClean="0"/>
+              <a:rPr lang="en-US"/>
               <a:t>Second level</a:t>
             </a:r>
           </a:p>
           <a:p>
             <a:pPr lvl="2"/>
             <a:r>
-              <a:rPr lang="en-US" smtClean="0"/>
+              <a:rPr lang="en-US"/>
               <a:t>Third level</a:t>
             </a:r>
           </a:p>
           <a:p>
             <a:pPr lvl="3"/>
             <a:r>
-              <a:rPr lang="en-US" smtClean="0"/>
+              <a:rPr lang="en-US"/>
               <a:t>Fourth level</a:t>
             </a:r>
           </a:p>
           <a:p>
             <a:pPr lvl="4"/>
             <a:r>
-              <a:rPr lang="en-US" smtClean="0"/>
+              <a:rPr lang="en-US"/>
               <a:t>Fifth level</a:t>
             </a:r>
-            <a:endParaRPr lang="en-US"/>
           </a:p>
         </p:txBody>
       </p:sp>
@@ -2596,7 +2579,7 @@
           <a:p>
             <a:pPr lvl="0"/>
             <a:r>
-              <a:rPr lang="en-US" smtClean="0"/>
+              <a:rPr lang="en-US"/>
               <a:t>Edit Master text styles</a:t>
             </a:r>
           </a:p>
@@ -2652,38 +2635,37 @@
           <a:p>
             <a:pPr lvl="0"/>
             <a:r>
-              <a:rPr lang="en-US" smtClean="0"/>
+              <a:rPr lang="en-US"/>
               <a:t>Edit Master text styles</a:t>
             </a:r>
           </a:p>
           <a:p>
             <a:pPr lvl="1"/>
             <a:r>
-              <a:rPr lang="en-US" smtClean="0"/>
+              <a:rPr lang="en-US"/>
               <a:t>Second level</a:t>
             </a:r>
           </a:p>
           <a:p>
             <a:pPr lvl="2"/>
             <a:r>
-              <a:rPr lang="en-US" smtClean="0"/>
+              <a:rPr lang="en-US"/>
               <a:t>Third level</a:t>
             </a:r>
           </a:p>
           <a:p>
             <a:pPr lvl="3"/>
             <a:r>
-              <a:rPr lang="en-US" smtClean="0"/>
+              <a:rPr lang="en-US"/>
               <a:t>Fourth level</a:t>
             </a:r>
           </a:p>
           <a:p>
             <a:pPr lvl="4"/>
             <a:r>
-              <a:rPr lang="en-US" smtClean="0"/>
+              <a:rPr lang="en-US"/>
               <a:t>Fifth level</a:t>
             </a:r>
-            <a:endParaRPr lang="en-US"/>
           </a:p>
         </p:txBody>
       </p:sp>
@@ -2704,7 +2686,7 @@
           <a:p>
             <a:fld id="{56B6BD69-149A-CD41-9E7C-E241C9398BA0}" type="datetimeFigureOut">
               <a:rPr lang="en-US" smtClean="0"/>
-              <a:t>3/14/2017</a:t>
+              <a:t>4/13/2017</a:t>
             </a:fld>
             <a:endParaRPr lang="en-US"/>
           </a:p>
@@ -2798,10 +2780,9 @@
           <a:lstStyle/>
           <a:p>
             <a:r>
-              <a:rPr lang="en-US" smtClean="0"/>
+              <a:rPr lang="en-US"/>
               <a:t>Click to edit Master title style</a:t>
             </a:r>
-            <a:endParaRPr lang="en-US"/>
           </a:p>
         </p:txBody>
       </p:sp>
@@ -2822,7 +2803,7 @@
           <a:p>
             <a:fld id="{56B6BD69-149A-CD41-9E7C-E241C9398BA0}" type="datetimeFigureOut">
               <a:rPr lang="en-US" smtClean="0"/>
-              <a:t>3/14/2017</a:t>
+              <a:t>4/13/2017</a:t>
             </a:fld>
             <a:endParaRPr lang="en-US"/>
           </a:p>
@@ -2917,7 +2898,7 @@
           <a:p>
             <a:fld id="{56B6BD69-149A-CD41-9E7C-E241C9398BA0}" type="datetimeFigureOut">
               <a:rPr lang="en-US" smtClean="0"/>
-              <a:t>3/14/2017</a:t>
+              <a:t>4/13/2017</a:t>
             </a:fld>
             <a:endParaRPr lang="en-US"/>
           </a:p>
@@ -3020,10 +3001,9 @@
           </a:lstStyle>
           <a:p>
             <a:r>
-              <a:rPr lang="en-US" smtClean="0"/>
+              <a:rPr lang="en-US"/>
               <a:t>Click to edit Master title style</a:t>
             </a:r>
-            <a:endParaRPr lang="en-US"/>
           </a:p>
         </p:txBody>
       </p:sp>
@@ -3077,38 +3057,37 @@
           <a:p>
             <a:pPr lvl="0"/>
             <a:r>
-              <a:rPr lang="en-US" smtClean="0"/>
+              <a:rPr lang="en-US"/>
               <a:t>Edit Master text styles</a:t>
             </a:r>
           </a:p>
           <a:p>
             <a:pPr lvl="1"/>
             <a:r>
-              <a:rPr lang="en-US" smtClean="0"/>
+              <a:rPr lang="en-US"/>
               <a:t>Second level</a:t>
             </a:r>
           </a:p>
           <a:p>
             <a:pPr lvl="2"/>
             <a:r>
-              <a:rPr lang="en-US" smtClean="0"/>
+              <a:rPr lang="en-US"/>
               <a:t>Third level</a:t>
             </a:r>
           </a:p>
           <a:p>
             <a:pPr lvl="3"/>
             <a:r>
-              <a:rPr lang="en-US" smtClean="0"/>
+              <a:rPr lang="en-US"/>
               <a:t>Fourth level</a:t>
             </a:r>
           </a:p>
           <a:p>
             <a:pPr lvl="4"/>
             <a:r>
-              <a:rPr lang="en-US" smtClean="0"/>
+              <a:rPr lang="en-US"/>
               <a:t>Fifth level</a:t>
             </a:r>
-            <a:endParaRPr lang="en-US"/>
           </a:p>
         </p:txBody>
       </p:sp>
@@ -3171,7 +3150,7 @@
           <a:p>
             <a:pPr lvl="0"/>
             <a:r>
-              <a:rPr lang="en-US" smtClean="0"/>
+              <a:rPr lang="en-US"/>
               <a:t>Edit Master text styles</a:t>
             </a:r>
           </a:p>
@@ -3194,7 +3173,7 @@
           <a:p>
             <a:fld id="{56B6BD69-149A-CD41-9E7C-E241C9398BA0}" type="datetimeFigureOut">
               <a:rPr lang="en-US" smtClean="0"/>
-              <a:t>3/14/2017</a:t>
+              <a:t>4/13/2017</a:t>
             </a:fld>
             <a:endParaRPr lang="en-US"/>
           </a:p>
@@ -3297,10 +3276,9 @@
           </a:lstStyle>
           <a:p>
             <a:r>
-              <a:rPr lang="en-US" smtClean="0"/>
+              <a:rPr lang="en-US"/>
               <a:t>Click to edit Master title style</a:t>
             </a:r>
-            <a:endParaRPr lang="en-US"/>
           </a:p>
         </p:txBody>
       </p:sp>
@@ -3362,10 +3340,9 @@
           </a:lstStyle>
           <a:p>
             <a:r>
-              <a:rPr lang="en-US" smtClean="0"/>
+              <a:rPr lang="en-US"/>
               <a:t>Click icon to add picture</a:t>
             </a:r>
-            <a:endParaRPr lang="en-US"/>
           </a:p>
         </p:txBody>
       </p:sp>
@@ -3428,7 +3405,7 @@
           <a:p>
             <a:pPr lvl="0"/>
             <a:r>
-              <a:rPr lang="en-US" smtClean="0"/>
+              <a:rPr lang="en-US"/>
               <a:t>Edit Master text styles</a:t>
             </a:r>
           </a:p>
@@ -3451,7 +3428,7 @@
           <a:p>
             <a:fld id="{56B6BD69-149A-CD41-9E7C-E241C9398BA0}" type="datetimeFigureOut">
               <a:rPr lang="en-US" smtClean="0"/>
-              <a:t>3/14/2017</a:t>
+              <a:t>4/13/2017</a:t>
             </a:fld>
             <a:endParaRPr lang="en-US"/>
           </a:p>
@@ -3560,10 +3537,9 @@
           <a:lstStyle/>
           <a:p>
             <a:r>
-              <a:rPr lang="en-US" smtClean="0"/>
+              <a:rPr lang="en-US"/>
               <a:t>Click to edit Master title style</a:t>
             </a:r>
-            <a:endParaRPr lang="en-US"/>
           </a:p>
         </p:txBody>
       </p:sp>
@@ -3594,35 +3570,35 @@
           <a:p>
             <a:pPr lvl="0"/>
             <a:r>
-              <a:rPr lang="en-US" smtClean="0"/>
+              <a:rPr lang="en-US"/>
               <a:t>Edit Master text styles</a:t>
             </a:r>
           </a:p>
           <a:p>
             <a:pPr lvl="1"/>
             <a:r>
-              <a:rPr lang="en-US" smtClean="0"/>
+              <a:rPr lang="en-US"/>
               <a:t>Second level</a:t>
             </a:r>
           </a:p>
           <a:p>
             <a:pPr lvl="2"/>
             <a:r>
-              <a:rPr lang="en-US" smtClean="0"/>
+              <a:rPr lang="en-US"/>
               <a:t>Third level</a:t>
             </a:r>
           </a:p>
           <a:p>
             <a:pPr lvl="3"/>
             <a:r>
-              <a:rPr lang="en-US" smtClean="0"/>
+              <a:rPr lang="en-US"/>
               <a:t>Fourth level</a:t>
             </a:r>
           </a:p>
           <a:p>
             <a:pPr lvl="4"/>
             <a:r>
-              <a:rPr lang="en-US" smtClean="0"/>
+              <a:rPr lang="en-US"/>
               <a:t>Fifth level</a:t>
             </a:r>
             <a:endParaRPr lang="en-US" dirty="0"/>
@@ -3664,7 +3640,7 @@
           <a:p>
             <a:fld id="{56B6BD69-149A-CD41-9E7C-E241C9398BA0}" type="datetimeFigureOut">
               <a:rPr lang="en-US" smtClean="0"/>
-              <a:t>3/14/2017</a:t>
+              <a:t>4/13/2017</a:t>
             </a:fld>
             <a:endParaRPr lang="en-US"/>
           </a:p>
@@ -4063,10 +4039,9 @@
           <a:p>
             <a:pPr algn="l"/>
             <a:r>
-              <a:rPr lang="en-US" sz="8000" b="1" cap="all" dirty="0" smtClean="0"/>
+              <a:rPr lang="en-US" sz="8000" b="1" cap="all" dirty="0"/>
               <a:t>Machine Learn Your Way to March Madness Glory!</a:t>
             </a:r>
-            <a:endParaRPr lang="en-US" sz="8000" b="1" cap="all" dirty="0"/>
           </a:p>
         </p:txBody>
       </p:sp>
@@ -4083,7 +4058,7 @@
         <p:spPr>
           <a:xfrm>
             <a:off x="12469125" y="4348745"/>
-            <a:ext cx="18951755" cy="1991672"/>
+            <a:ext cx="18951755" cy="1504549"/>
           </a:xfrm>
         </p:spPr>
         <p:txBody>
@@ -4096,7 +4071,7 @@
               <a:buNone/>
             </a:pPr>
             <a:r>
-              <a:rPr lang="en-US" sz="5400" dirty="0" smtClean="0">
+              <a:rPr lang="en-US" sz="5400" dirty="0">
                 <a:solidFill>
                   <a:srgbClr val="F37321"/>
                 </a:solidFill>
@@ -4125,7 +4100,7 @@
         <p:spPr>
           <a:xfrm>
             <a:off x="12469125" y="6839376"/>
-            <a:ext cx="9222475" cy="6047739"/>
+            <a:ext cx="9222475" cy="5199905"/>
           </a:xfrm>
           <a:prstGeom prst="rect">
             <a:avLst/>
@@ -4172,7 +4147,7 @@
         </p:nvSpPr>
         <p:spPr>
           <a:xfrm>
-            <a:off x="12469124" y="14181213"/>
+            <a:off x="12405649" y="13465559"/>
             <a:ext cx="9222476" cy="18282689"/>
           </a:xfrm>
           <a:prstGeom prst="rect">
@@ -4197,15 +4172,7 @@
                   <a:srgbClr val="5D87A1"/>
                 </a:solidFill>
               </a:rPr>
-              <a:t>PROJECT </a:t>
-            </a:r>
-            <a:r>
-              <a:rPr lang="en-US" sz="3600" b="1" dirty="0" smtClean="0">
-                <a:solidFill>
-                  <a:srgbClr val="5D87A1"/>
-                </a:solidFill>
-              </a:rPr>
-              <a:t>INFORMATION</a:t>
+              <a:t>PROJECT INFORMATION</a:t>
             </a:r>
           </a:p>
           <a:p>
@@ -4215,11 +4182,11 @@
               </a:spcAft>
             </a:pPr>
             <a:r>
-              <a:rPr lang="en-US" sz="3000" b="1" dirty="0" smtClean="0"/>
+              <a:rPr lang="en-US" sz="3000" b="1" dirty="0"/>
               <a:t>Class: </a:t>
             </a:r>
             <a:r>
-              <a:rPr lang="en-US" sz="3000" dirty="0" smtClean="0"/>
+              <a:rPr lang="en-US" sz="3000" dirty="0"/>
               <a:t>CS Senior Capstone, 2016-2017</a:t>
             </a:r>
           </a:p>
@@ -4230,7 +4197,7 @@
               </a:spcAft>
             </a:pPr>
             <a:r>
-              <a:rPr lang="en-US" sz="3000" b="1" dirty="0" smtClean="0"/>
+              <a:rPr lang="en-US" sz="3000" b="1" dirty="0"/>
               <a:t>Developers:</a:t>
             </a:r>
           </a:p>
@@ -4243,11 +4210,11 @@
               <a:buChar char="•"/>
             </a:pPr>
             <a:r>
-              <a:rPr lang="en-US" sz="3000" b="1" dirty="0" smtClean="0"/>
+              <a:rPr lang="en-US" sz="3000" b="1" dirty="0"/>
               <a:t>Alex Hoffer</a:t>
             </a:r>
             <a:r>
-              <a:rPr lang="en-US" sz="3000" dirty="0" smtClean="0"/>
+              <a:rPr lang="en-US" sz="3000" dirty="0"/>
               <a:t> (hoffera@oregonstate.edu)</a:t>
             </a:r>
           </a:p>
@@ -4260,11 +4227,11 @@
               <a:buChar char="•"/>
             </a:pPr>
             <a:r>
-              <a:rPr lang="en-US" sz="3000" b="1" dirty="0" smtClean="0"/>
+              <a:rPr lang="en-US" sz="3000" b="1" dirty="0"/>
               <a:t>Jacob Smith </a:t>
             </a:r>
             <a:r>
-              <a:rPr lang="en-US" sz="3000" dirty="0" smtClean="0"/>
+              <a:rPr lang="en-US" sz="3000" dirty="0"/>
               <a:t>(smitjaco@oregonstate.edu)</a:t>
             </a:r>
           </a:p>
@@ -4277,15 +4244,15 @@
               <a:buChar char="•"/>
             </a:pPr>
             <a:r>
-              <a:rPr lang="en-US" sz="3000" b="1" dirty="0" err="1" smtClean="0"/>
+              <a:rPr lang="en-US" sz="3000" b="1" dirty="0" err="1"/>
               <a:t>Chongxian</a:t>
             </a:r>
             <a:r>
-              <a:rPr lang="en-US" sz="3000" b="1" dirty="0" smtClean="0"/>
+              <a:rPr lang="en-US" sz="3000" b="1" dirty="0"/>
               <a:t> Chen </a:t>
             </a:r>
             <a:r>
-              <a:rPr lang="en-US" sz="3000" dirty="0" smtClean="0"/>
+              <a:rPr lang="en-US" sz="3000" dirty="0"/>
               <a:t>(chencho@oregonstate.edu)</a:t>
             </a:r>
             <a:endParaRPr lang="en-US" sz="3600" dirty="0">
@@ -4301,14 +4268,14 @@
               </a:spcAft>
             </a:pPr>
             <a:r>
-              <a:rPr lang="en-US" sz="3000" b="1" dirty="0" smtClean="0"/>
+              <a:rPr lang="en-US" sz="3000" b="1" dirty="0"/>
               <a:t>Client: </a:t>
             </a:r>
             <a:r>
-              <a:rPr lang="en-US" sz="3000" dirty="0" smtClean="0"/>
+              <a:rPr lang="en-US" sz="3000" dirty="0"/>
               <a:t>Dr. Victor Hsu, Oregon State University, Department of Biochemistry and Biophysics</a:t>
             </a:r>
-            <a:endParaRPr lang="en-US" sz="3600" b="1" dirty="0" smtClean="0">
+            <a:endParaRPr lang="en-US" sz="3600" b="1" dirty="0">
               <a:solidFill>
                 <a:srgbClr val="5D87A1"/>
               </a:solidFill>
@@ -4321,7 +4288,7 @@
               </a:spcAft>
             </a:pPr>
             <a:r>
-              <a:rPr lang="en-US" sz="3600" b="1" dirty="0" smtClean="0">
+              <a:rPr lang="en-US" sz="3600" b="1" dirty="0">
                 <a:solidFill>
                   <a:srgbClr val="5D87A1"/>
                 </a:solidFill>
@@ -4336,7 +4303,7 @@
               </a:spcAft>
             </a:pPr>
             <a:r>
-              <a:rPr lang="en-US" sz="3000" dirty="0" smtClean="0"/>
+              <a:rPr lang="en-US" sz="3000" dirty="0"/>
               <a:t>To implement the module, we needed to complete the following five steps:</a:t>
             </a:r>
           </a:p>
@@ -4349,7 +4316,7 @@
               <a:buAutoNum type="arabicPeriod"/>
             </a:pPr>
             <a:r>
-              <a:rPr lang="en-US" sz="3000" dirty="0" smtClean="0"/>
+              <a:rPr lang="en-US" sz="3000" dirty="0"/>
               <a:t>Develop a Graphical User Interface (GUI)</a:t>
             </a:r>
           </a:p>
@@ -4362,7 +4329,7 @@
               <a:buAutoNum type="arabicPeriod"/>
             </a:pPr>
             <a:r>
-              <a:rPr lang="en-US" sz="3000" dirty="0" smtClean="0"/>
+              <a:rPr lang="en-US" sz="3000" dirty="0"/>
               <a:t>Aggregate/select college basketball statistics</a:t>
             </a:r>
           </a:p>
@@ -4375,7 +4342,7 @@
               <a:buAutoNum type="arabicPeriod"/>
             </a:pPr>
             <a:r>
-              <a:rPr lang="en-US" sz="3000" dirty="0" smtClean="0"/>
+              <a:rPr lang="en-US" sz="3000" dirty="0"/>
               <a:t>Feed statistics to machine learner</a:t>
             </a:r>
           </a:p>
@@ -4388,7 +4355,7 @@
               <a:buAutoNum type="arabicPeriod"/>
             </a:pPr>
             <a:r>
-              <a:rPr lang="en-US" sz="3000" dirty="0" smtClean="0"/>
+              <a:rPr lang="en-US" sz="3000" dirty="0"/>
               <a:t>Train a model</a:t>
             </a:r>
           </a:p>
@@ -4401,10 +4368,9 @@
               <a:buAutoNum type="arabicPeriod"/>
             </a:pPr>
             <a:r>
-              <a:rPr lang="en-US" sz="3000" dirty="0" smtClean="0"/>
+              <a:rPr lang="en-US" sz="3000" dirty="0"/>
               <a:t>Generate bracket of model</a:t>
             </a:r>
-            <a:endParaRPr lang="en-US" sz="3000" dirty="0"/>
           </a:p>
           <a:p>
             <a:pPr>
@@ -4413,16 +4379,8 @@
               </a:spcAft>
             </a:pPr>
             <a:r>
-              <a:rPr lang="en-US" sz="3000" dirty="0" smtClean="0"/>
-              <a:t>The following </a:t>
-            </a:r>
-            <a:r>
               <a:rPr lang="en-US" sz="3000" dirty="0"/>
-              <a:t>h</a:t>
-            </a:r>
-            <a:r>
-              <a:rPr lang="en-US" sz="3000" dirty="0" smtClean="0"/>
-              <a:t>eadings are technical descriptions of the five steps:</a:t>
+              <a:t>The following headings are technical descriptions of the five steps:</a:t>
             </a:r>
             <a:endParaRPr lang="en-US" sz="3600" b="1" dirty="0">
               <a:solidFill>
@@ -4437,7 +4395,7 @@
               </a:spcAft>
             </a:pPr>
             <a:r>
-              <a:rPr lang="en-US" sz="3600" b="1" dirty="0" smtClean="0">
+              <a:rPr lang="en-US" sz="3600" b="1" dirty="0">
                 <a:solidFill>
                   <a:srgbClr val="5D87A1"/>
                 </a:solidFill>
@@ -4452,33 +4410,20 @@
               </a:spcAft>
             </a:pPr>
             <a:r>
-              <a:rPr lang="en-US" sz="3000" dirty="0" smtClean="0"/>
-              <a:t>Alex used </a:t>
-            </a:r>
-            <a:r>
               <a:rPr lang="en-US" sz="3000" dirty="0"/>
-              <a:t>HTML, CSS, and JavaScript to produce the GUI for our web page. HTML was used to split the page into logical sections such as </a:t>
-            </a:r>
-            <a:r>
-              <a:rPr lang="en-US" sz="3000" dirty="0" smtClean="0"/>
-              <a:t>Home (found in Figure 1), Instructions (found in Figure 2), Module (found in Figure 4), </a:t>
+              <a:t>Alex used HTML, CSS, and JavaScript to produce the GUI for our web page. HTML was used to split the page into logical sections such as Home (found in Figure 1), Instructions (found in Figure 2), Module (found in Figure 4), Purpose, and About (found in Figure 3). We utilized CSS to make these sections look clean and usable. Finally, JavaScript was used to enhance the user experience by making the page interactive, such as turning certain buttons different colors upon clicking in order to notify the user of the action </a:t>
             </a:r>
             <a:r>
               <a:rPr lang="en-US" sz="3000" dirty="0"/>
-              <a:t>Purpose, and </a:t>
-            </a:r>
-            <a:r>
-              <a:rPr lang="en-US" sz="3000" dirty="0" smtClean="0"/>
-              <a:t>About (found in Figure 3). </a:t>
-            </a:r>
-            <a:r>
-              <a:rPr lang="en-US" sz="3000" dirty="0"/>
-              <a:t>We utilized CSS to make these sections look clean and usable. Finally, JavaScript was used to enhance the user experience by making </a:t>
-            </a:r>
-            <a:r>
-              <a:rPr lang="en-US" sz="3000" dirty="0" smtClean="0"/>
-              <a:t>the page interactive, such as turning certain buttons different colors upon clicking in order to notify the user of the action</a:t>
-            </a:r>
+              <a:t>they had just performed. </a:t>
+            </a:r>
+          </a:p>
+          <a:p>
+            <a:pPr>
+              <a:spcAft>
+                <a:spcPts val="1800"/>
+              </a:spcAft>
+            </a:pPr>
             <a:endParaRPr lang="en-US" sz="3600" b="1" dirty="0">
               <a:solidFill>
                 <a:srgbClr val="5D87A1"/>
@@ -4496,7 +4441,7 @@
         <p:spPr>
           <a:xfrm>
             <a:off x="22198405" y="6709525"/>
-            <a:ext cx="9222475" cy="18014769"/>
+            <a:ext cx="9222475" cy="12771171"/>
           </a:xfrm>
           <a:prstGeom prst="rect">
             <a:avLst/>
@@ -4515,21 +4460,6 @@
               </a:spcAft>
             </a:pPr>
             <a:r>
-              <a:rPr lang="en-US" sz="3000" dirty="0" smtClean="0"/>
-              <a:t>they had just </a:t>
-            </a:r>
-            <a:r>
-              <a:rPr lang="en-US" sz="3000" dirty="0"/>
-              <a:t>performed. </a:t>
-            </a:r>
-          </a:p>
-          <a:p>
-            <a:pPr>
-              <a:spcAft>
-                <a:spcPts val="1800"/>
-              </a:spcAft>
-            </a:pPr>
-            <a:r>
               <a:rPr lang="en-US" sz="4000" b="1" dirty="0">
                 <a:solidFill>
                   <a:srgbClr val="5D87A1"/>
@@ -4546,21 +4476,13 @@
             </a:pPr>
             <a:r>
               <a:rPr lang="en-US" sz="3000" dirty="0"/>
-              <a:t>College basketball statistics from 1985 to the current season were gathered from the websites Kaggle.com, ESPN.com, and NCAA.com in the CSV file extension and stored using PHP </a:t>
-            </a:r>
-            <a:r>
-              <a:rPr lang="en-US" sz="3000" dirty="0" err="1"/>
-              <a:t>MyAdmin</a:t>
-            </a:r>
-            <a:r>
-              <a:rPr lang="en-US" sz="3000" dirty="0"/>
-              <a:t>. This tool was selected because Jacob was familiar with it and found it usable. Since the regular season didn’t conclude until March, Jacob manually updated the database to reflect the current standings frequently until the final game was played</a:t>
-            </a:r>
-            <a:r>
-              <a:rPr lang="en-US" sz="3000" dirty="0" smtClean="0"/>
-              <a:t>.</a:t>
-            </a:r>
-            <a:endParaRPr lang="en-US" sz="3000" b="1" dirty="0" smtClean="0">
+              <a:t>Jacob gathered college basketball statistics from 1985 to the current season from the website Kaggle.com in the CSV file format. Since the regular season didn’t conclude until March, Jacob manually updated the database to reflect the current standings frequently until the final game was played. Then added stats from the tournament for future algorithms </a:t>
+            </a:r>
+            <a:r>
+              <a:rPr lang="en-US" sz="3000"/>
+              <a:t>and analysis.</a:t>
+            </a:r>
+            <a:endParaRPr lang="en-US" sz="3000" b="1" dirty="0">
               <a:solidFill>
                 <a:srgbClr val="5D87A1"/>
               </a:solidFill>
@@ -4573,20 +4495,12 @@
               </a:spcAft>
             </a:pPr>
             <a:r>
-              <a:rPr lang="en-US" sz="3600" b="1" dirty="0" smtClean="0">
-                <a:solidFill>
-                  <a:srgbClr val="5D87A1"/>
-                </a:solidFill>
-              </a:rPr>
-              <a:t>FEED </a:t>
-            </a:r>
-            <a:r>
               <a:rPr lang="en-US" sz="3600" b="1" dirty="0">
                 <a:solidFill>
                   <a:srgbClr val="5D87A1"/>
                 </a:solidFill>
               </a:rPr>
-              <a:t>STATISTICS TO MACHINE LEARNER</a:t>
+              <a:t>FEED STATISTICS TO MACHINE LEARNER</a:t>
             </a:r>
           </a:p>
           <a:p>
@@ -4605,13 +4519,9 @@
             </a:r>
             <a:r>
               <a:rPr lang="en-US" sz="3000" dirty="0"/>
-              <a:t> gathered the </a:t>
-            </a:r>
-            <a:r>
-              <a:rPr lang="en-US" sz="3000" dirty="0" smtClean="0"/>
-              <a:t>statistics the user selected and fed them into his machine learning module. </a:t>
-            </a:r>
-            <a:endParaRPr lang="en-US" sz="3600" b="1" dirty="0" smtClean="0">
+              <a:t> gathered the statistics the user selected and fed them into his machine learning module. </a:t>
+            </a:r>
+            <a:endParaRPr lang="en-US" sz="3600" b="1" dirty="0">
               <a:solidFill>
                 <a:srgbClr val="5D87A1"/>
               </a:solidFill>
@@ -4624,28 +4534,12 @@
               </a:spcAft>
             </a:pPr>
             <a:r>
-              <a:rPr lang="en-US" sz="3600" b="1" dirty="0" smtClean="0">
-                <a:solidFill>
-                  <a:srgbClr val="5D87A1"/>
-                </a:solidFill>
-              </a:rPr>
-              <a:t>TRAIN </a:t>
-            </a:r>
-            <a:r>
               <a:rPr lang="en-US" sz="3600" b="1" dirty="0">
                 <a:solidFill>
                   <a:srgbClr val="5D87A1"/>
                 </a:solidFill>
               </a:rPr>
-              <a:t>A MODEL BASED ON </a:t>
-            </a:r>
-            <a:r>
-              <a:rPr lang="en-US" sz="3600" b="1" dirty="0" smtClean="0">
-                <a:solidFill>
-                  <a:srgbClr val="5D87A1"/>
-                </a:solidFill>
-              </a:rPr>
-              <a:t>STATISTICS</a:t>
+              <a:t>TRAIN A MODEL BASED ON STATISTICS</a:t>
             </a:r>
           </a:p>
           <a:p>
@@ -4672,11 +4566,7 @@
             </a:r>
             <a:r>
               <a:rPr lang="en-US" sz="3000" dirty="0"/>
-              <a:t>-Learn, an open source Python library, to generate </a:t>
-            </a:r>
-            <a:r>
-              <a:rPr lang="en-US" sz="3000" dirty="0" smtClean="0"/>
-              <a:t>a machine learned model based on the statistics chosen by the user.</a:t>
+              <a:t>-Learn, an open source Python library, to generate a machine learned model based on the statistics chosen by the user.</a:t>
             </a:r>
             <a:endParaRPr lang="en-US" sz="3600" b="1" dirty="0">
               <a:solidFill>
@@ -4696,15 +4586,7 @@
                   <a:srgbClr val="5D87A1"/>
                 </a:solidFill>
               </a:rPr>
-              <a:t>GENERATE BRACKET OF </a:t>
-            </a:r>
-            <a:r>
-              <a:rPr lang="en-US" sz="3600" b="1" dirty="0" smtClean="0">
-                <a:solidFill>
-                  <a:srgbClr val="5D87A1"/>
-                </a:solidFill>
-              </a:rPr>
-              <a:t>RESULTS</a:t>
+              <a:t>GENERATE BRACKET OF RESULTS</a:t>
             </a:r>
           </a:p>
           <a:p>
@@ -4714,10 +4596,9 @@
               </a:spcAft>
             </a:pPr>
             <a:r>
-              <a:rPr lang="en-US" sz="3000" dirty="0" smtClean="0"/>
-              <a:t>The machine learned model was then transferred into bracket form by Jake (incomplete).</a:t>
-            </a:r>
-            <a:endParaRPr lang="en-US" sz="3000" dirty="0"/>
+              <a:rPr lang="en-US" sz="3000" dirty="0"/>
+              <a:t>The machine learned model was then transferred into bracket form by Jake using a python script.</a:t>
+            </a:r>
           </a:p>
           <a:p>
             <a:pPr>
@@ -4805,18 +4686,13 @@
               </a:spcAft>
             </a:pPr>
             <a:r>
-              <a:rPr lang="en-US" sz="3600" b="1" dirty="0" smtClean="0">
+              <a:rPr lang="en-US" sz="3600" b="1" dirty="0">
                 <a:solidFill>
                   <a:srgbClr val="5D87A1"/>
                 </a:solidFill>
               </a:rPr>
               <a:t>IMPORTANCE OF MACHINE LEARNING TO BIOCHEMISTRY AND BIOPHYSICS</a:t>
             </a:r>
-            <a:endParaRPr lang="en-US" sz="3600" b="1" dirty="0">
-              <a:solidFill>
-                <a:srgbClr val="5D87A1"/>
-              </a:solidFill>
-            </a:endParaRPr>
           </a:p>
           <a:p>
             <a:pPr>
@@ -4825,48 +4701,8 @@
               </a:spcAft>
             </a:pPr>
             <a:r>
-              <a:rPr lang="en-US" sz="3000" dirty="0" smtClean="0"/>
-              <a:t>Biochemistry </a:t>
-            </a:r>
-            <a:r>
               <a:rPr lang="en-US" sz="3000" dirty="0"/>
-              <a:t>and biophysics are two ﬁelds that are ripe with many exciting </a:t>
-            </a:r>
-            <a:r>
-              <a:rPr lang="en-US" sz="3000" dirty="0" smtClean="0"/>
-              <a:t>breakthroughs. Machine learning, a type of artificial intelligence where computer programs adapt to new data, is </a:t>
-            </a:r>
-            <a:r>
-              <a:rPr lang="en-US" sz="3000" dirty="0"/>
-              <a:t>used by biochemists and biophysicists to do things like generate new strands of DNA. Our client, a professor in the department of Biochemistry and Biophysics at </a:t>
-            </a:r>
-            <a:r>
-              <a:rPr lang="en-US" sz="3000" dirty="0" smtClean="0"/>
-              <a:t>OSU, </a:t>
-            </a:r>
-            <a:r>
-              <a:rPr lang="en-US" sz="3000" dirty="0"/>
-              <a:t>recognized there was a need </a:t>
-            </a:r>
-            <a:r>
-              <a:rPr lang="en-US" sz="3000" dirty="0" smtClean="0"/>
-              <a:t>for his </a:t>
-            </a:r>
-            <a:r>
-              <a:rPr lang="en-US" sz="3000" dirty="0"/>
-              <a:t>budding </a:t>
-            </a:r>
-            <a:r>
-              <a:rPr lang="en-US" sz="3000" dirty="0" smtClean="0"/>
-              <a:t>scientists </a:t>
-            </a:r>
-            <a:r>
-              <a:rPr lang="en-US" sz="3000" dirty="0"/>
-              <a:t>to understand machine learning so they could </a:t>
-            </a:r>
-            <a:r>
-              <a:rPr lang="en-US" sz="3000" dirty="0" smtClean="0"/>
-              <a:t>be better prepared for their careers.</a:t>
+              <a:t>Biochemistry and biophysics are two ﬁelds that are ripe with many exciting breakthroughs. Machine learning, a type of artificial intelligence where computer programs adapt to new data, is used by biochemists and biophysicists to do things like generate new strands of DNA. Our client, a professor in the department of Biochemistry and Biophysics at OSU, recognized there was a need for his budding scientists to understand machine learning so they could be better prepared for their careers.</a:t>
             </a:r>
           </a:p>
           <a:p>
@@ -4876,18 +4712,13 @@
               </a:spcAft>
             </a:pPr>
             <a:r>
-              <a:rPr lang="en-US" sz="3600" b="1" dirty="0" smtClean="0">
+              <a:rPr lang="en-US" sz="3600" b="1" dirty="0">
                 <a:solidFill>
                   <a:srgbClr val="5D87A1"/>
                 </a:solidFill>
               </a:rPr>
               <a:t>A NEED FOR A MACHINE LEARNING INSTRUCTIONAL TOOL</a:t>
             </a:r>
-            <a:endParaRPr lang="en-US" sz="3600" b="1" dirty="0">
-              <a:solidFill>
-                <a:srgbClr val="5D87A1"/>
-              </a:solidFill>
-            </a:endParaRPr>
           </a:p>
           <a:p>
             <a:pPr>
@@ -4896,60 +4727,8 @@
               </a:spcAft>
             </a:pPr>
             <a:r>
-              <a:rPr lang="en-US" sz="3000" dirty="0" smtClean="0"/>
-              <a:t>Our client </a:t>
-            </a:r>
-            <a:r>
               <a:rPr lang="en-US" sz="3000" dirty="0"/>
-              <a:t>noticed that the Biochemistry and Biophysics curriculum at OSU did not encourage undergraduate students </a:t>
-            </a:r>
-            <a:r>
-              <a:rPr lang="en-US" sz="3000" dirty="0" smtClean="0"/>
-              <a:t>to </a:t>
-            </a:r>
-            <a:r>
-              <a:rPr lang="en-US" sz="3000" dirty="0"/>
-              <a:t>learn machine learning. Even if </a:t>
-            </a:r>
-            <a:r>
-              <a:rPr lang="en-US" sz="3000" dirty="0" smtClean="0"/>
-              <a:t>machine learning </a:t>
-            </a:r>
-            <a:r>
-              <a:rPr lang="en-US" sz="3000" dirty="0"/>
-              <a:t>classes were to </a:t>
-            </a:r>
-            <a:r>
-              <a:rPr lang="en-US" sz="3000" dirty="0" smtClean="0"/>
-              <a:t>become a </a:t>
-            </a:r>
-            <a:r>
-              <a:rPr lang="en-US" sz="3000" dirty="0"/>
-              <a:t>cornerstone of </a:t>
-            </a:r>
-            <a:r>
-              <a:rPr lang="en-US" sz="3000" dirty="0" smtClean="0"/>
-              <a:t>their coursework</a:t>
-            </a:r>
-            <a:r>
-              <a:rPr lang="en-US" sz="3000" dirty="0"/>
-              <a:t>, the content would be </a:t>
-            </a:r>
-            <a:r>
-              <a:rPr lang="en-US" sz="3000" dirty="0" smtClean="0"/>
-              <a:t>difﬁcult </a:t>
-            </a:r>
-            <a:r>
-              <a:rPr lang="en-US" sz="3000" dirty="0"/>
-              <a:t>for people without a Computer Science background. To make matters worse, teaching machine learning to these students through its application to biochemistry and biophysics is particularly challenging, since machine learned models of DNA can be hard to </a:t>
-            </a:r>
-            <a:r>
-              <a:rPr lang="en-US" sz="3000" dirty="0" smtClean="0"/>
-              <a:t>interpret</a:t>
-            </a:r>
-            <a:r>
-              <a:rPr lang="en-US" sz="3000" dirty="0"/>
-              <a:t>.</a:t>
+              <a:t>Our client noticed that the Biochemistry and Biophysics curriculum at OSU did not encourage undergraduate students to learn machine learning. Even if machine learning classes were to become a cornerstone of their coursework, the content would be difﬁcult for people without a Computer Science background. To make matters worse, teaching machine learning to these students through its application to biochemistry and biophysics is particularly challenging, since machine learned models of DNA can be hard to interpret.</a:t>
             </a:r>
           </a:p>
           <a:p>
@@ -4959,18 +4738,13 @@
               </a:spcAft>
             </a:pPr>
             <a:r>
-              <a:rPr lang="en-US" sz="3600" b="1" dirty="0" smtClean="0">
+              <a:rPr lang="en-US" sz="3600" b="1" dirty="0">
                 <a:solidFill>
                   <a:srgbClr val="5D87A1"/>
                 </a:solidFill>
               </a:rPr>
               <a:t>WHAT WE WERE COMMISSIONED TO DO</a:t>
             </a:r>
-            <a:endParaRPr lang="en-US" sz="3600" b="1" dirty="0">
-              <a:solidFill>
-                <a:srgbClr val="5D87A1"/>
-              </a:solidFill>
-            </a:endParaRPr>
           </a:p>
           <a:p>
             <a:pPr>
@@ -4979,24 +4753,8 @@
               </a:spcAft>
             </a:pPr>
             <a:r>
-              <a:rPr lang="en-US" sz="3000" dirty="0" smtClean="0"/>
-              <a:t>We were enlisted to </a:t>
-            </a:r>
-            <a:r>
               <a:rPr lang="en-US" sz="3000" dirty="0"/>
-              <a:t>produce an online instructional module </a:t>
-            </a:r>
-            <a:r>
-              <a:rPr lang="en-US" sz="3000" dirty="0" smtClean="0"/>
-              <a:t>where these students could grasp machine learning fundamentals </a:t>
-            </a:r>
-            <a:r>
-              <a:rPr lang="en-US" sz="3000" dirty="0"/>
-              <a:t>in a fun </a:t>
-            </a:r>
-            <a:r>
-              <a:rPr lang="en-US" sz="3000" dirty="0" smtClean="0"/>
-              <a:t>and clear manner. Our client wanted us to develop this module so that students could generate machine learned NCAA March Madness brackets. Since a fundamental aspect of learning machine learning is recognizing how the inclusion or exclusion of data influences resulting models, this module would satisfy the need by producing models (brackets) that were distinguishable from each other based on the college basketball statistics a user chose to train their model on. In addition to this clarity, the module would also be fun to use, because rather than focus machine learning on biochemistry and biophysics, it would instead concentrate on men’s college basketball.</a:t>
+              <a:t>We were enlisted to produce an online instructional module where these students could grasp machine learning fundamentals in a fun and clear manner. Our client wanted us to develop this module so that students could generate machine learned NCAA March Madness brackets. Since a fundamental aspect of learning machine learning is recognizing how the inclusion or exclusion of data influences resulting models, this module would satisfy the need by producing models (brackets) that were distinguishable from each other based on the college basketball statistics a user chose to train their model on. In addition to this clarity, the module would also be fun to use, because rather than focus machine learning on biochemistry and biophysics, it would instead concentrate on men’s college basketball.</a:t>
             </a:r>
           </a:p>
           <a:p>
@@ -5188,18 +4946,13 @@
           <a:p>
             <a:pPr algn="l"/>
             <a:r>
-              <a:rPr lang="en-US" sz="5400" dirty="0" smtClean="0">
+              <a:rPr lang="en-US" sz="5400" dirty="0">
                 <a:solidFill>
                   <a:srgbClr val="F37321"/>
                 </a:solidFill>
               </a:rPr>
               <a:t>Introduction/Background</a:t>
             </a:r>
-            <a:endParaRPr lang="en-US" sz="5400" dirty="0">
-              <a:solidFill>
-                <a:srgbClr val="F37321"/>
-              </a:solidFill>
-            </a:endParaRPr>
           </a:p>
         </p:txBody>
       </p:sp>
@@ -5429,18 +5182,13 @@
           </a:lstStyle>
           <a:p>
             <a:r>
-              <a:rPr lang="en-US" sz="5400" dirty="0" smtClean="0">
+              <a:rPr lang="en-US" sz="5400" dirty="0">
                 <a:solidFill>
                   <a:schemeClr val="bg1"/>
                 </a:solidFill>
               </a:rPr>
               <a:t>CONCLUSION</a:t>
             </a:r>
-            <a:endParaRPr lang="en-US" sz="5400" dirty="0">
-              <a:solidFill>
-                <a:schemeClr val="bg1"/>
-              </a:solidFill>
-            </a:endParaRPr>
           </a:p>
         </p:txBody>
       </p:sp>
@@ -5472,14 +5220,14 @@
               </a:spcAft>
             </a:pPr>
             <a:r>
-              <a:rPr lang="en-US" sz="3600" b="1" dirty="0" smtClean="0">
+              <a:rPr lang="en-US" sz="3600" b="1" dirty="0">
                 <a:solidFill>
                   <a:srgbClr val="F37321"/>
                 </a:solidFill>
               </a:rPr>
               <a:t>FEATURES PROVIDED BY MODULE:</a:t>
             </a:r>
-            <a:endParaRPr lang="en-US" sz="3600" dirty="0" smtClean="0">
+            <a:endParaRPr lang="en-US" sz="3600" dirty="0">
               <a:solidFill>
                 <a:schemeClr val="bg1"/>
               </a:solidFill>
@@ -5494,18 +5242,13 @@
               <a:buChar char="•"/>
             </a:pPr>
             <a:r>
-              <a:rPr lang="en-US" sz="3000" dirty="0" smtClean="0">
+              <a:rPr lang="en-US" sz="3000" dirty="0">
                 <a:solidFill>
                   <a:schemeClr val="bg1"/>
                 </a:solidFill>
               </a:rPr>
               <a:t>A Graphical User Interface (GUI) including a home page, an instructions page, an about the developers page, and a statement of purpose.</a:t>
             </a:r>
-            <a:endParaRPr lang="en-US" sz="3000" dirty="0" smtClean="0">
-              <a:solidFill>
-                <a:schemeClr val="bg1"/>
-              </a:solidFill>
-            </a:endParaRPr>
           </a:p>
           <a:p>
             <a:pPr marL="457200" indent="-457200">
@@ -5516,18 +5259,13 @@
               <a:buChar char="•"/>
             </a:pPr>
             <a:r>
-              <a:rPr lang="en-US" sz="3000" dirty="0" smtClean="0">
+              <a:rPr lang="en-US" sz="3000" dirty="0">
                 <a:solidFill>
                   <a:schemeClr val="bg1"/>
                 </a:solidFill>
               </a:rPr>
               <a:t>The ability to select from a set of college basketball statistics.</a:t>
             </a:r>
-            <a:endParaRPr lang="en-US" sz="3000" dirty="0" smtClean="0">
-              <a:solidFill>
-                <a:schemeClr val="bg1"/>
-              </a:solidFill>
-            </a:endParaRPr>
           </a:p>
           <a:p>
             <a:pPr marL="457200" indent="-457200">
@@ -5538,18 +5276,13 @@
               <a:buChar char="•"/>
             </a:pPr>
             <a:r>
-              <a:rPr lang="en-US" sz="3000" dirty="0" smtClean="0">
+              <a:rPr lang="en-US" sz="3000" dirty="0">
                 <a:solidFill>
                   <a:schemeClr val="bg1"/>
                 </a:solidFill>
               </a:rPr>
               <a:t>A machine learned bracket that corresponds to the specific statistics the user requested the model to be trained on.</a:t>
             </a:r>
-            <a:endParaRPr lang="en-US" sz="3000" dirty="0" smtClean="0">
-              <a:solidFill>
-                <a:schemeClr val="bg1"/>
-              </a:solidFill>
-            </a:endParaRPr>
           </a:p>
           <a:p>
             <a:pPr>
@@ -5558,7 +5291,7 @@
               </a:spcAft>
             </a:pPr>
             <a:r>
-              <a:rPr lang="en-US" sz="3000" dirty="0" smtClean="0">
+              <a:rPr lang="en-US" sz="3000" dirty="0">
                 <a:solidFill>
                   <a:schemeClr val="bg1"/>
                 </a:solidFill>
@@ -5566,7 +5299,7 @@
               <a:t>As of mid-March 2017, we can conclude that the project is incomplete. The machine learning module has only been partially implemented by </a:t>
             </a:r>
             <a:r>
-              <a:rPr lang="en-US" sz="3000" dirty="0" err="1" smtClean="0">
+              <a:rPr lang="en-US" sz="3000" dirty="0" err="1">
                 <a:solidFill>
                   <a:schemeClr val="bg1"/>
                 </a:solidFill>
@@ -5574,7 +5307,7 @@
               <a:t>Chongxian</a:t>
             </a:r>
             <a:r>
-              <a:rPr lang="en-US" sz="3000" dirty="0" smtClean="0">
+              <a:rPr lang="en-US" sz="3000" dirty="0">
                 <a:solidFill>
                   <a:schemeClr val="bg1"/>
                 </a:solidFill>
@@ -5582,7 +5315,7 @@
               <a:t>. This has had a number of different effects: the user is not able to generate predictions, and as such, the other developers have not been able to work on converting the generated models into brackets. Once the final pieces are put into place by </a:t>
             </a:r>
             <a:r>
-              <a:rPr lang="en-US" sz="3000" dirty="0" err="1" smtClean="0">
+              <a:rPr lang="en-US" sz="3000" dirty="0" err="1">
                 <a:solidFill>
                   <a:schemeClr val="bg1"/>
                 </a:solidFill>
@@ -5590,26 +5323,13 @@
               <a:t>Chongxian</a:t>
             </a:r>
             <a:r>
-              <a:rPr lang="en-US" sz="3000" dirty="0" smtClean="0">
+              <a:rPr lang="en-US" sz="3000" dirty="0">
                 <a:solidFill>
                   <a:schemeClr val="bg1"/>
                 </a:solidFill>
               </a:rPr>
-              <a:t>, Jake can work on pretty printing the bracket, which Alex will help with. Future machine learning modules similar to this one will want to have a better way for users to select college basketball statistics. Additionally, the developers of such modules may wish to have prior machine learning experience, a more proper mode of </a:t>
-            </a:r>
-            <a:r>
-              <a:rPr lang="en-US" sz="3000" dirty="0" smtClean="0">
-                <a:solidFill>
-                  <a:schemeClr val="bg1"/>
-                </a:solidFill>
-              </a:rPr>
-              <a:t>communication, and a more rigid implementation schedule in order to allow for time at the end to polish each component of the module separately.</a:t>
-            </a:r>
-            <a:endParaRPr lang="en-US" sz="3000" dirty="0" smtClean="0">
-              <a:solidFill>
-                <a:schemeClr val="bg1"/>
-              </a:solidFill>
-            </a:endParaRPr>
+              <a:t>, Jake can work on pretty printing the bracket, which Alex will help with. Future machine learning modules similar to this one will want to have a better way for users to select college basketball statistics. Additionally, the developers of such modules may wish to have prior machine learning experience, a more proper mode of communication, and a more rigid implementation schedule in order to allow for time at the end to polish each component of the module separately.</a:t>
+            </a:r>
           </a:p>
         </p:txBody>
       </p:sp>
@@ -5659,7 +5379,7 @@
         </p:blipFill>
         <p:spPr>
           <a:xfrm>
-            <a:off x="12469125" y="6799627"/>
+            <a:off x="12468969" y="5991542"/>
             <a:ext cx="9222474" cy="6047739"/>
           </a:xfrm>
           <a:prstGeom prst="rect">
@@ -5707,8 +5427,8 @@
         </p:blipFill>
         <p:spPr>
           <a:xfrm>
-            <a:off x="21691599" y="20116791"/>
-            <a:ext cx="10630453" cy="10534467"/>
+            <a:off x="21691599" y="19849804"/>
+            <a:ext cx="10630453" cy="10801454"/>
           </a:xfrm>
           <a:prstGeom prst="rect">
             <a:avLst/>
@@ -5723,7 +5443,7 @@
         </p:nvSpPr>
         <p:spPr>
           <a:xfrm>
-            <a:off x="12881113" y="12887115"/>
+            <a:off x="12881113" y="12177529"/>
             <a:ext cx="8030817" cy="1015663"/>
           </a:xfrm>
           <a:prstGeom prst="rect">
@@ -5739,14 +5459,13 @@
           <a:p>
             <a:pPr algn="ctr"/>
             <a:r>
-              <a:rPr lang="en-US" sz="3000" i="1" dirty="0" smtClean="0"/>
+              <a:rPr lang="en-US" sz="3000" i="1" dirty="0"/>
               <a:t>Fig. 2: </a:t>
             </a:r>
             <a:r>
-              <a:rPr lang="en-US" sz="3000" dirty="0" smtClean="0"/>
+              <a:rPr lang="en-US" sz="3000" dirty="0"/>
               <a:t>Instructional page that informs users on how to use the machine learning module.</a:t>
             </a:r>
-            <a:endParaRPr lang="en-US" sz="3000" dirty="0"/>
           </a:p>
         </p:txBody>
       </p:sp>
@@ -5774,14 +5493,13 @@
           <a:p>
             <a:pPr algn="ctr"/>
             <a:r>
-              <a:rPr lang="en-US" sz="3000" i="1" dirty="0" smtClean="0"/>
+              <a:rPr lang="en-US" sz="3000" i="1" dirty="0"/>
               <a:t>Fig. 1: </a:t>
             </a:r>
             <a:r>
-              <a:rPr lang="en-US" sz="3000" dirty="0" smtClean="0"/>
+              <a:rPr lang="en-US" sz="3000" dirty="0"/>
               <a:t>Home page. The “Menu” button allows the user to navigate through the website.</a:t>
             </a:r>
-            <a:endParaRPr lang="en-US" sz="3000" dirty="0"/>
           </a:p>
         </p:txBody>
       </p:sp>
@@ -5809,14 +5527,13 @@
           <a:p>
             <a:pPr algn="ctr"/>
             <a:r>
-              <a:rPr lang="en-US" sz="3000" i="1" dirty="0" smtClean="0"/>
+              <a:rPr lang="en-US" sz="3000" i="1" dirty="0"/>
               <a:t>Fig. 3: </a:t>
             </a:r>
             <a:r>
-              <a:rPr lang="en-US" sz="3000" dirty="0" smtClean="0"/>
+              <a:rPr lang="en-US" sz="3000" dirty="0"/>
               <a:t>About the Developers page that includes our information.</a:t>
             </a:r>
-            <a:endParaRPr lang="en-US" sz="3000" dirty="0"/>
           </a:p>
         </p:txBody>
       </p:sp>
@@ -5844,7 +5561,7 @@
           <a:p>
             <a:pPr algn="ctr"/>
             <a:r>
-              <a:rPr lang="en-US" sz="3000" i="1" dirty="0" smtClean="0">
+              <a:rPr lang="en-US" sz="3000" i="1" dirty="0">
                 <a:solidFill>
                   <a:schemeClr val="bg1"/>
                 </a:solidFill>
@@ -5852,18 +5569,13 @@
               <a:t>Fig. 4: </a:t>
             </a:r>
             <a:r>
-              <a:rPr lang="en-US" sz="3000" dirty="0" smtClean="0">
+              <a:rPr lang="en-US" sz="3000" dirty="0">
                 <a:solidFill>
                   <a:schemeClr val="bg1"/>
                 </a:solidFill>
               </a:rPr>
               <a:t>Module page that hosts the machine learning module.</a:t>
             </a:r>
-            <a:endParaRPr lang="en-US" sz="3000" dirty="0">
-              <a:solidFill>
-                <a:schemeClr val="bg1"/>
-              </a:solidFill>
-            </a:endParaRPr>
           </a:p>
         </p:txBody>
       </p:sp>
@@ -5877,13 +5589,6 @@
   <p:clrMapOvr>
     <a:masterClrMapping/>
   </p:clrMapOvr>
-  <p:timing>
-    <p:tnLst>
-      <p:par>
-        <p:cTn id="1" dur="indefinite" restart="never" nodeType="tmRoot"/>
-      </p:par>
-    </p:tnLst>
-  </p:timing>
 </p:sld>
 </file>
 

</xml_diff>

<commit_message>
Poster draft 2 done.
</commit_message>
<xml_diff>
--- a/Poster/Group59Poster.pptx
+++ b/Poster/Group59Poster.pptx
@@ -238,7 +238,7 @@
           <a:p>
             <a:fld id="{7395F848-6DDA-9042-95D4-0071278BB24B}" type="datetimeFigureOut">
               <a:rPr lang="en-US" smtClean="0"/>
-              <a:t>4/15/17</a:t>
+              <a:t>4/16/2017</a:t>
             </a:fld>
             <a:endParaRPr lang="en-US"/>
           </a:p>
@@ -1386,7 +1386,7 @@
           <a:p>
             <a:fld id="{56B6BD69-149A-CD41-9E7C-E241C9398BA0}" type="datetimeFigureOut">
               <a:rPr lang="en-US" smtClean="0"/>
-              <a:t>4/15/17</a:t>
+              <a:t>4/16/2017</a:t>
             </a:fld>
             <a:endParaRPr lang="en-US"/>
           </a:p>
@@ -1564,7 +1564,7 @@
           <a:p>
             <a:fld id="{56B6BD69-149A-CD41-9E7C-E241C9398BA0}" type="datetimeFigureOut">
               <a:rPr lang="en-US" smtClean="0"/>
-              <a:t>4/15/17</a:t>
+              <a:t>4/16/2017</a:t>
             </a:fld>
             <a:endParaRPr lang="en-US"/>
           </a:p>
@@ -1732,7 +1732,7 @@
           <a:p>
             <a:fld id="{56B6BD69-149A-CD41-9E7C-E241C9398BA0}" type="datetimeFigureOut">
               <a:rPr lang="en-US" smtClean="0"/>
-              <a:t>4/15/17</a:t>
+              <a:t>4/16/2017</a:t>
             </a:fld>
             <a:endParaRPr lang="en-US"/>
           </a:p>
@@ -1977,7 +1977,7 @@
           <a:p>
             <a:fld id="{56B6BD69-149A-CD41-9E7C-E241C9398BA0}" type="datetimeFigureOut">
               <a:rPr lang="en-US" smtClean="0"/>
-              <a:t>4/15/17</a:t>
+              <a:t>4/16/2017</a:t>
             </a:fld>
             <a:endParaRPr lang="en-US"/>
           </a:p>
@@ -2262,7 +2262,7 @@
           <a:p>
             <a:fld id="{56B6BD69-149A-CD41-9E7C-E241C9398BA0}" type="datetimeFigureOut">
               <a:rPr lang="en-US" smtClean="0"/>
-              <a:t>4/15/17</a:t>
+              <a:t>4/16/2017</a:t>
             </a:fld>
             <a:endParaRPr lang="en-US"/>
           </a:p>
@@ -2686,7 +2686,7 @@
           <a:p>
             <a:fld id="{56B6BD69-149A-CD41-9E7C-E241C9398BA0}" type="datetimeFigureOut">
               <a:rPr lang="en-US" smtClean="0"/>
-              <a:t>4/15/17</a:t>
+              <a:t>4/16/2017</a:t>
             </a:fld>
             <a:endParaRPr lang="en-US"/>
           </a:p>
@@ -2803,7 +2803,7 @@
           <a:p>
             <a:fld id="{56B6BD69-149A-CD41-9E7C-E241C9398BA0}" type="datetimeFigureOut">
               <a:rPr lang="en-US" smtClean="0"/>
-              <a:t>4/15/17</a:t>
+              <a:t>4/16/2017</a:t>
             </a:fld>
             <a:endParaRPr lang="en-US"/>
           </a:p>
@@ -2898,7 +2898,7 @@
           <a:p>
             <a:fld id="{56B6BD69-149A-CD41-9E7C-E241C9398BA0}" type="datetimeFigureOut">
               <a:rPr lang="en-US" smtClean="0"/>
-              <a:t>4/15/17</a:t>
+              <a:t>4/16/2017</a:t>
             </a:fld>
             <a:endParaRPr lang="en-US"/>
           </a:p>
@@ -3173,7 +3173,7 @@
           <a:p>
             <a:fld id="{56B6BD69-149A-CD41-9E7C-E241C9398BA0}" type="datetimeFigureOut">
               <a:rPr lang="en-US" smtClean="0"/>
-              <a:t>4/15/17</a:t>
+              <a:t>4/16/2017</a:t>
             </a:fld>
             <a:endParaRPr lang="en-US"/>
           </a:p>
@@ -3428,7 +3428,7 @@
           <a:p>
             <a:fld id="{56B6BD69-149A-CD41-9E7C-E241C9398BA0}" type="datetimeFigureOut">
               <a:rPr lang="en-US" smtClean="0"/>
-              <a:t>4/15/17</a:t>
+              <a:t>4/16/2017</a:t>
             </a:fld>
             <a:endParaRPr lang="en-US"/>
           </a:p>
@@ -3640,7 +3640,7 @@
           <a:p>
             <a:fld id="{56B6BD69-149A-CD41-9E7C-E241C9398BA0}" type="datetimeFigureOut">
               <a:rPr lang="en-US" smtClean="0"/>
-              <a:t>4/15/17</a:t>
+              <a:t>4/16/2017</a:t>
             </a:fld>
             <a:endParaRPr lang="en-US"/>
           </a:p>
@@ -4015,6 +4015,30 @@
           <a:chExt cx="0" cy="0"/>
         </a:xfrm>
       </p:grpSpPr>
+      <p:pic>
+        <p:nvPicPr>
+          <p:cNvPr id="7" name="Picture 6"/>
+          <p:cNvPicPr>
+            <a:picLocks noChangeAspect="1"/>
+          </p:cNvPicPr>
+          <p:nvPr/>
+        </p:nvPicPr>
+        <p:blipFill>
+          <a:blip r:embed="rId3"/>
+          <a:stretch>
+            <a:fillRect/>
+          </a:stretch>
+        </p:blipFill>
+        <p:spPr>
+          <a:xfrm>
+            <a:off x="22198405" y="25281228"/>
+            <a:ext cx="9222475" cy="5843241"/>
+          </a:xfrm>
+          <a:prstGeom prst="rect">
+            <a:avLst/>
+          </a:prstGeom>
+        </p:spPr>
+      </p:pic>
       <p:sp>
         <p:nvSpPr>
           <p:cNvPr id="2" name="Title 1"/>
@@ -4076,8 +4100,21 @@
                   <a:srgbClr val="F37321"/>
                 </a:solidFill>
               </a:rPr>
-              <a:t>Teaching Biochemists and Biophysicists Machine Learning</a:t>
-            </a:r>
+              <a:t>Teaching Biochemists and Biophysicists </a:t>
+            </a:r>
+            <a:r>
+              <a:rPr lang="en-US" sz="5400" dirty="0" smtClean="0">
+                <a:solidFill>
+                  <a:srgbClr val="F37321"/>
+                </a:solidFill>
+              </a:rPr>
+              <a:t>Machine Learning</a:t>
+            </a:r>
+            <a:endParaRPr lang="en-US" sz="5400" dirty="0">
+              <a:solidFill>
+                <a:srgbClr val="F37321"/>
+              </a:solidFill>
+            </a:endParaRPr>
           </a:p>
           <a:p>
             <a:pPr marL="0" indent="0" algn="l">
@@ -4166,13 +4203,33 @@
                 <a:spcPts val="1800"/>
               </a:spcAft>
             </a:pPr>
+            <a:endParaRPr lang="en-US" sz="3600" b="1" dirty="0" smtClean="0">
+              <a:solidFill>
+                <a:srgbClr val="5D87A1"/>
+              </a:solidFill>
+            </a:endParaRPr>
+          </a:p>
+          <a:p>
+            <a:pPr>
+              <a:spcAft>
+                <a:spcPts val="1800"/>
+              </a:spcAft>
+            </a:pPr>
+            <a:r>
+              <a:rPr lang="en-US" sz="3600" b="1" dirty="0" smtClean="0">
+                <a:solidFill>
+                  <a:srgbClr val="5D87A1"/>
+                </a:solidFill>
+              </a:rPr>
+              <a:t>PROJECT </a:t>
+            </a:r>
             <a:r>
               <a:rPr lang="en-US" sz="3600" b="1" dirty="0">
                 <a:solidFill>
                   <a:srgbClr val="5D87A1"/>
                 </a:solidFill>
               </a:rPr>
-              <a:t>PROJECT INFORMATION</a:t>
+              <a:t>INFORMATION</a:t>
             </a:r>
           </a:p>
           <a:p>
@@ -4356,8 +4413,13 @@
             </a:pPr>
             <a:r>
               <a:rPr lang="en-US" sz="3000" dirty="0"/>
-              <a:t>Train a model</a:t>
-            </a:r>
+              <a:t>Train a </a:t>
+            </a:r>
+            <a:r>
+              <a:rPr lang="en-US" sz="3000" dirty="0" smtClean="0"/>
+              <a:t>model using an algorithm of the user’s choosing</a:t>
+            </a:r>
+            <a:endParaRPr lang="en-US" sz="3000" dirty="0"/>
           </a:p>
           <a:p>
             <a:pPr marL="514350" indent="-514350">
@@ -4369,7 +4431,23 @@
             </a:pPr>
             <a:r>
               <a:rPr lang="en-US" sz="3000" dirty="0"/>
-              <a:t>Generate bracket of model</a:t>
+              <a:t>Generate </a:t>
+            </a:r>
+            <a:r>
+              <a:rPr lang="en-US" sz="3000" dirty="0" smtClean="0"/>
+              <a:t>March Madness bracket </a:t>
+            </a:r>
+            <a:r>
+              <a:rPr lang="en-US" sz="3000" dirty="0" smtClean="0"/>
+              <a:t>that represents the</a:t>
+            </a:r>
+            <a:r>
+              <a:rPr lang="en-US" sz="3000" dirty="0" smtClean="0"/>
+              <a:t> </a:t>
+            </a:r>
+            <a:r>
+              <a:rPr lang="en-US" sz="3000" dirty="0"/>
+              <a:t>model</a:t>
             </a:r>
           </a:p>
           <a:p>
@@ -4411,7 +4489,27 @@
             </a:pPr>
             <a:r>
               <a:rPr lang="en-US" sz="3000" dirty="0"/>
-              <a:t>Alex used HTML, CSS, and JavaScript to produce the GUI for our web page. HTML was used to split the page into logical sections such as Home (found in Figure 1), Instructions (found in Figure 2), Module (found in Figure 4), Purpose, and About (found in Figure 3). We utilized CSS to make these sections look clean and usable. Finally, JavaScript was used to enhance the user experience by making the page interactive, such as turning certain buttons different colors upon clicking in order to notify the user of the action they had just performed. </a:t>
+              <a:t>Alex used HTML, CSS, and JavaScript to produce the GUI for our web page. HTML was used to split the page into logical sections such as Home (found in </a:t>
+            </a:r>
+            <a:r>
+              <a:rPr lang="en-US" sz="3000" i="1" dirty="0" smtClean="0"/>
+              <a:t>Fig. 1</a:t>
+            </a:r>
+            <a:r>
+              <a:rPr lang="en-US" sz="3000" dirty="0" smtClean="0"/>
+              <a:t>), Instructions, Module, </a:t>
+            </a:r>
+            <a:r>
+              <a:rPr lang="en-US" sz="3000" dirty="0"/>
+              <a:t>Purpose, and </a:t>
+            </a:r>
+            <a:r>
+              <a:rPr lang="en-US" sz="3000" dirty="0" smtClean="0"/>
+              <a:t>About. </a:t>
+            </a:r>
+            <a:r>
+              <a:rPr lang="en-US" sz="3000" dirty="0"/>
+              <a:t>We utilized CSS to make these sections look clean and usable. Finally, JavaScript was used to enhance the user experience by making the page interactive, such as turning certain buttons different colors upon clicking in order to notify the user of the action they had just performed. </a:t>
             </a:r>
           </a:p>
           <a:p>
@@ -4472,13 +4570,49 @@
             </a:pPr>
             <a:r>
               <a:rPr lang="en-US" sz="3000" dirty="0"/>
-              <a:t>Jacob gathered college basketball statistics from 1985 to the current season from the website Kaggle.com in the CSV file format. Since the regular season didn’t conclude until March, Jacob manually updated the database to reflect the current standings frequently until the final game was played. Then added stats from the tournament for future algorithms and analysis.</a:t>
-            </a:r>
-            <a:endParaRPr lang="en-US" sz="3000" b="1" dirty="0">
-              <a:solidFill>
-                <a:srgbClr val="5D87A1"/>
-              </a:solidFill>
-            </a:endParaRPr>
+              <a:t>Jacob gathered college basketball statistics from 1985 to the current season from the website Kaggle.com in the CSV file format. Since the regular season didn’t conclude until March, Jacob manually updated the database to reflect the current standings frequently until the final game was played. </a:t>
+            </a:r>
+            <a:r>
+              <a:rPr lang="en-US" sz="3000" dirty="0" smtClean="0"/>
+              <a:t>Then, he added </a:t>
+            </a:r>
+            <a:r>
+              <a:rPr lang="en-US" sz="3000" dirty="0"/>
+              <a:t>stats from the tournament for future </a:t>
+            </a:r>
+            <a:r>
+              <a:rPr lang="en-US" sz="3000" dirty="0" smtClean="0"/>
+              <a:t>use in algorithms </a:t>
+            </a:r>
+            <a:r>
+              <a:rPr lang="en-US" sz="3000" dirty="0"/>
+              <a:t>and analysis</a:t>
+            </a:r>
+            <a:r>
+              <a:rPr lang="en-US" sz="3000" dirty="0"/>
+              <a:t>. </a:t>
+            </a:r>
+            <a:r>
+              <a:rPr lang="en-US" sz="3000" dirty="0" smtClean="0"/>
+              <a:t>We used a Python </a:t>
+            </a:r>
+            <a:r>
+              <a:rPr lang="en-US" sz="3000" dirty="0"/>
+              <a:t>script to allow users to </a:t>
+            </a:r>
+            <a:r>
+              <a:rPr lang="en-US" sz="3000" dirty="0" smtClean="0"/>
+              <a:t>choose from a wide variety of stats including categories like field goals attempted per game to train a model on, as demonstrated by </a:t>
+            </a:r>
+            <a:r>
+              <a:rPr lang="en-US" sz="3000" i="1" dirty="0" smtClean="0"/>
+              <a:t>Fig. 2</a:t>
+            </a:r>
+            <a:r>
+              <a:rPr lang="en-US" sz="3000" dirty="0" smtClean="0"/>
+              <a:t>.</a:t>
+            </a:r>
+            <a:endParaRPr lang="en-US" sz="3000" dirty="0" smtClean="0"/>
           </a:p>
           <a:p>
             <a:pPr>
@@ -4487,12 +4621,20 @@
               </a:spcAft>
             </a:pPr>
             <a:r>
+              <a:rPr lang="en-US" sz="3600" b="1" dirty="0" smtClean="0">
+                <a:solidFill>
+                  <a:srgbClr val="5D87A1"/>
+                </a:solidFill>
+              </a:rPr>
+              <a:t>FEED </a:t>
+            </a:r>
+            <a:r>
               <a:rPr lang="en-US" sz="3600" b="1" dirty="0">
                 <a:solidFill>
                   <a:srgbClr val="5D87A1"/>
                 </a:solidFill>
               </a:rPr>
-              <a:t>FEED STATISTICS TO MACHINE LEARNER</a:t>
+              <a:t>STATISTICS TO MACHINE LEARNER</a:t>
             </a:r>
           </a:p>
           <a:p>
@@ -4507,7 +4649,7 @@
             </a:r>
             <a:r>
               <a:rPr lang="en-US" sz="3000" dirty="0" smtClean="0"/>
-              <a:t>Python </a:t>
+              <a:t>the Python </a:t>
             </a:r>
             <a:r>
               <a:rPr lang="en-US" sz="3000" dirty="0" err="1" smtClean="0"/>
@@ -4515,7 +4657,15 @@
             </a:r>
             <a:r>
               <a:rPr lang="en-US" sz="3000" dirty="0" smtClean="0"/>
-              <a:t>-Learn library, Chongxian read the CSV files into </a:t>
+              <a:t>-Learn library, Chongxian read the CSV </a:t>
+            </a:r>
+            <a:r>
+              <a:rPr lang="en-US" sz="3000" dirty="0" smtClean="0"/>
+              <a:t>files of the user selected statistics </a:t>
+            </a:r>
+            <a:r>
+              <a:rPr lang="en-US" sz="3000" dirty="0" smtClean="0"/>
+              <a:t>into </a:t>
             </a:r>
             <a:r>
               <a:rPr lang="en-US" sz="3000" dirty="0" err="1" smtClean="0"/>
@@ -4526,12 +4676,8 @@
               <a:t> </a:t>
             </a:r>
             <a:r>
-              <a:rPr lang="en-US" sz="3000" dirty="0" err="1" smtClean="0"/>
-              <a:t>arraies</a:t>
-            </a:r>
-            <a:r>
               <a:rPr lang="en-US" sz="3000" dirty="0" smtClean="0"/>
-              <a:t>. By using a basketball ELO rating system, the supervised machine learning model is able to fit on the statistics and predict new matches. A CSV file of the match results between two teams with probability is generated as a result.</a:t>
+              <a:t>arrays. </a:t>
             </a:r>
           </a:p>
           <a:p>
@@ -4546,15 +4692,7 @@
                   <a:srgbClr val="5D87A1"/>
                 </a:solidFill>
               </a:rPr>
-              <a:t>GENERATE </a:t>
-            </a:r>
-            <a:r>
-              <a:rPr lang="en-US" sz="3600" b="1" dirty="0">
-                <a:solidFill>
-                  <a:srgbClr val="5D87A1"/>
-                </a:solidFill>
-              </a:rPr>
-              <a:t>BRACKET OF RESULTS</a:t>
+              <a:t>TRAIN A MODEL USING ALGORITHM</a:t>
             </a:r>
           </a:p>
           <a:p>
@@ -4564,29 +4702,42 @@
               </a:spcAft>
             </a:pPr>
             <a:r>
+              <a:rPr lang="en-US" sz="3000" dirty="0" smtClean="0"/>
+              <a:t>Along with their choice of statistics, users are also able to choose between different </a:t>
+            </a:r>
+            <a:r>
               <a:rPr lang="en-US" sz="3000" dirty="0"/>
-              <a:t>The </a:t>
+              <a:t>machine learning estimators </a:t>
             </a:r>
             <a:r>
               <a:rPr lang="en-US" sz="3000" dirty="0" smtClean="0"/>
-              <a:t>prediction CSV file generated from the machine learning model was </a:t>
+              <a:t>such as </a:t>
             </a:r>
             <a:r>
               <a:rPr lang="en-US" sz="3000" dirty="0"/>
-              <a:t>then transferred into bracket form by Jake using a python script</a:t>
+              <a:t>Linear Regression and SVM Polynomial. </a:t>
+            </a:r>
+            <a:r>
+              <a:rPr lang="en-US" sz="3000" dirty="0" smtClean="0"/>
+              <a:t>By </a:t>
+            </a:r>
+            <a:r>
+              <a:rPr lang="en-US" sz="3000" dirty="0"/>
+              <a:t>using a basketball ELO rating system, the supervised machine learning model is able to fit on the statistics and predict new matches. A CSV file of the match results between two teams with the probability is generated as a </a:t>
+            </a:r>
+            <a:r>
+              <a:rPr lang="en-US" sz="3000" dirty="0" smtClean="0"/>
+              <a:t>result. The </a:t>
+            </a:r>
+            <a:r>
+              <a:rPr lang="en-US" sz="3000" dirty="0"/>
+              <a:t>bracket results effectively present how the users choice affects the machine learning prediction</a:t>
             </a:r>
             <a:r>
               <a:rPr lang="en-US" sz="3000" dirty="0" smtClean="0"/>
               <a:t>.</a:t>
             </a:r>
-            <a:r>
-              <a:rPr lang="en-US" sz="3200" b="1" dirty="0">
-                <a:solidFill>
-                  <a:srgbClr val="5D87A1"/>
-                </a:solidFill>
-              </a:rPr>
-              <a:t> </a:t>
-            </a:r>
+            <a:endParaRPr lang="en-US" sz="3000" dirty="0" smtClean="0"/>
           </a:p>
           <a:p>
             <a:pPr>
@@ -4600,7 +4751,15 @@
                   <a:srgbClr val="5D87A1"/>
                 </a:solidFill>
               </a:rPr>
-              <a:t>MAKE OUR MODULE MORE EDUCATIONAL</a:t>
+              <a:t>GENERATE </a:t>
+            </a:r>
+            <a:r>
+              <a:rPr lang="en-US" sz="3600" b="1" dirty="0">
+                <a:solidFill>
+                  <a:srgbClr val="5D87A1"/>
+                </a:solidFill>
+              </a:rPr>
+              <a:t>BRACKET OF RESULTS</a:t>
             </a:r>
           </a:p>
           <a:p>
@@ -4610,26 +4769,61 @@
               </a:spcAft>
             </a:pPr>
             <a:r>
-              <a:rPr lang="en-US" sz="3200" dirty="0" smtClean="0"/>
-              <a:t>By modifying the python script, we allow the users to choose stats in basketball matches they think are important to generate their own prediction. They are also able to choose </a:t>
-            </a:r>
-            <a:r>
-              <a:rPr lang="en-US" sz="3200" dirty="0" smtClean="0"/>
-              <a:t>different machine learning estimators like Linear Regression and SVM Polynomial. The bracket results effectively present how the users choice affects the machine learning prediction.</a:t>
-            </a:r>
-            <a:endParaRPr lang="en-US" sz="3200" b="1" dirty="0">
-              <a:solidFill>
-                <a:srgbClr val="5D87A1"/>
-              </a:solidFill>
-            </a:endParaRPr>
-          </a:p>
-          <a:p>
-            <a:pPr>
-              <a:spcAft>
-                <a:spcPts val="1800"/>
-              </a:spcAft>
-            </a:pPr>
-            <a:endParaRPr lang="en-US" sz="3000" dirty="0" smtClean="0"/>
+              <a:rPr lang="en-US" sz="3000" dirty="0" smtClean="0"/>
+              <a:t>While a machine learned module is being </a:t>
+            </a:r>
+            <a:r>
+              <a:rPr lang="en-US" sz="3000" dirty="0" smtClean="0"/>
+              <a:t>generated, the user is presented with a screen (seen in </a:t>
+            </a:r>
+            <a:r>
+              <a:rPr lang="en-US" sz="3000" i="1" dirty="0" smtClean="0"/>
+              <a:t>Fig. </a:t>
+            </a:r>
+            <a:r>
+              <a:rPr lang="en-US" sz="3000" dirty="0" smtClean="0"/>
+              <a:t>3) that includes the command line arguments given to </a:t>
+            </a:r>
+            <a:r>
+              <a:rPr lang="en-US" sz="3000" dirty="0" err="1" smtClean="0"/>
+              <a:t>SciKit</a:t>
+            </a:r>
+            <a:r>
+              <a:rPr lang="en-US" sz="3000" dirty="0" smtClean="0"/>
+              <a:t> and informs the user on which steps are necessary to complete their request. </a:t>
+            </a:r>
+            <a:r>
+              <a:rPr lang="en-US" sz="3000" dirty="0" smtClean="0"/>
+              <a:t>The </a:t>
+            </a:r>
+            <a:r>
+              <a:rPr lang="en-US" sz="3000" dirty="0" smtClean="0"/>
+              <a:t>prediction CSV file generated from the machine learning model was </a:t>
+            </a:r>
+            <a:r>
+              <a:rPr lang="en-US" sz="3000" dirty="0"/>
+              <a:t>then transferred into bracket form by Jake using a </a:t>
+            </a:r>
+            <a:r>
+              <a:rPr lang="en-US" sz="3000" dirty="0" smtClean="0"/>
+              <a:t>Python </a:t>
+            </a:r>
+            <a:r>
+              <a:rPr lang="en-US" sz="3000" dirty="0"/>
+              <a:t>script</a:t>
+            </a:r>
+            <a:r>
+              <a:rPr lang="en-US" sz="3000" dirty="0" smtClean="0"/>
+              <a:t>.</a:t>
+            </a:r>
+            <a:r>
+              <a:rPr lang="en-US" sz="3200" b="1" dirty="0">
+                <a:solidFill>
+                  <a:srgbClr val="5D87A1"/>
+                </a:solidFill>
+              </a:rPr>
+              <a:t> </a:t>
+            </a:r>
           </a:p>
         </p:txBody>
       </p:sp>
@@ -5287,7 +5481,15 @@
                   <a:schemeClr val="bg1"/>
                 </a:solidFill>
               </a:rPr>
-              <a:t>The ability to select from a set of college basketball statistics.</a:t>
+              <a:t>The ability to select from a set of college basketball statistics</a:t>
+            </a:r>
+            <a:r>
+              <a:rPr lang="en-US" sz="3000" dirty="0" smtClean="0">
+                <a:solidFill>
+                  <a:schemeClr val="bg1"/>
+                </a:solidFill>
+              </a:rPr>
+              <a:t>.</a:t>
             </a:r>
           </a:p>
           <a:p>
@@ -5299,12 +5501,50 @@
               <a:buChar char="•"/>
             </a:pPr>
             <a:r>
+              <a:rPr lang="en-US" sz="3000" dirty="0" smtClean="0">
+                <a:solidFill>
+                  <a:schemeClr val="bg1"/>
+                </a:solidFill>
+              </a:rPr>
+              <a:t>The ability to select from a set of popular machine learning algorithms.</a:t>
+            </a:r>
+            <a:endParaRPr lang="en-US" sz="3000" dirty="0">
+              <a:solidFill>
+                <a:schemeClr val="bg1"/>
+              </a:solidFill>
+            </a:endParaRPr>
+          </a:p>
+          <a:p>
+            <a:pPr marL="457200" indent="-457200">
+              <a:spcAft>
+                <a:spcPts val="1800"/>
+              </a:spcAft>
+              <a:buFont typeface="Arial"/>
+              <a:buChar char="•"/>
+            </a:pPr>
+            <a:r>
               <a:rPr lang="en-US" sz="3000" dirty="0">
                 <a:solidFill>
                   <a:schemeClr val="bg1"/>
                 </a:solidFill>
               </a:rPr>
-              <a:t>A machine learned bracket that corresponds to the specific statistics the user requested the model to be trained on.</a:t>
+              <a:t>A machine learned bracket that corresponds to the specific </a:t>
+            </a:r>
+            <a:r>
+              <a:rPr lang="en-US" sz="3000" dirty="0" smtClean="0">
+                <a:solidFill>
+                  <a:schemeClr val="bg1"/>
+                </a:solidFill>
+              </a:rPr>
+              <a:t>statistics and algorithm </a:t>
+            </a:r>
+            <a:r>
+              <a:rPr lang="en-US" sz="3000" dirty="0">
+                <a:solidFill>
+                  <a:schemeClr val="bg1"/>
+                </a:solidFill>
+              </a:rPr>
+              <a:t>the user requested the model to be trained on.</a:t>
             </a:r>
           </a:p>
           <a:p>
@@ -5314,20 +5554,44 @@
               </a:spcAft>
             </a:pPr>
             <a:r>
+              <a:rPr lang="en-US" sz="3000" dirty="0" smtClean="0">
+                <a:solidFill>
+                  <a:schemeClr val="bg1"/>
+                </a:solidFill>
+              </a:rPr>
+              <a:t>The </a:t>
+            </a:r>
+            <a:r>
               <a:rPr lang="en-US" sz="3000" dirty="0">
                 <a:solidFill>
                   <a:schemeClr val="bg1"/>
                 </a:solidFill>
               </a:rPr>
-              <a:t>As of mid-March 2017, we can conclude that the project is incomplete. The machine learning module has only been partially implemented </a:t>
-            </a:r>
-            <a:r>
-              <a:rPr lang="en-US" sz="3000" dirty="0" err="1">
+              <a:t>project </a:t>
+            </a:r>
+            <a:r>
+              <a:rPr lang="en-US" sz="3000" dirty="0" smtClean="0">
                 <a:solidFill>
                   <a:schemeClr val="bg1"/>
                 </a:solidFill>
               </a:rPr>
-              <a:t>bhad</a:t>
+              <a:t>was </a:t>
+            </a:r>
+            <a:r>
+              <a:rPr lang="en-US" sz="3000" dirty="0" smtClean="0">
+                <a:solidFill>
+                  <a:schemeClr val="bg1"/>
+                </a:solidFill>
+              </a:rPr>
+              <a:t>completed in early April. The user goes to the web pag</a:t>
+            </a:r>
+            <a:r>
+              <a:rPr lang="en-US" sz="3000" dirty="0" smtClean="0">
+                <a:solidFill>
+                  <a:schemeClr val="bg1"/>
+                </a:solidFill>
+              </a:rPr>
+              <a:t>e and can get project information before they access the module itself.</a:t>
             </a:r>
             <a:r>
               <a:rPr lang="en-US" sz="3000" dirty="0">
@@ -5335,7 +5599,23 @@
                   <a:schemeClr val="bg1"/>
                 </a:solidFill>
               </a:rPr>
-              <a:t> a number of different y </a:t>
+              <a:t> </a:t>
+            </a:r>
+            <a:r>
+              <a:rPr lang="en-US" sz="3000" dirty="0" smtClean="0">
+                <a:solidFill>
+                  <a:schemeClr val="bg1"/>
+                </a:solidFill>
+              </a:rPr>
+              <a:t>All functional requirements as outlined by our client were completed. Future improvements to our module could include more machine learning algorithms, a wider variety of statistical categories, a more elegant looking outputted bracket, and finding a way to increase the speed at which the machine learning algorithms generate results. </a:t>
+            </a:r>
+            <a:r>
+              <a:rPr lang="en-US" sz="3000" dirty="0" smtClean="0">
+                <a:solidFill>
+                  <a:schemeClr val="bg1"/>
+                </a:solidFill>
+              </a:rPr>
+              <a:t>Additionally</a:t>
             </a:r>
             <a:r>
               <a:rPr lang="en-US" sz="3000" dirty="0">
@@ -5343,39 +5623,7 @@
                   <a:schemeClr val="bg1"/>
                 </a:solidFill>
               </a:rPr>
-              <a:t>Chongxian. This has </a:t>
-            </a:r>
-            <a:r>
-              <a:rPr lang="en-US" sz="3000" dirty="0" smtClean="0">
-                <a:solidFill>
-                  <a:schemeClr val="bg1"/>
-                </a:solidFill>
-              </a:rPr>
-              <a:t>effects</a:t>
-            </a:r>
-            <a:r>
-              <a:rPr lang="en-US" sz="3000" dirty="0">
-                <a:solidFill>
-                  <a:schemeClr val="bg1"/>
-                </a:solidFill>
-              </a:rPr>
-              <a:t>: the user is not able to generate predictions, and as such, the other developers have not been able to work on converting the generated models into brackets. Once the final pieces are put into place by </a:t>
-            </a:r>
-            <a:r>
-              <a:rPr lang="en-US" sz="3000" dirty="0" err="1">
-                <a:solidFill>
-                  <a:schemeClr val="bg1"/>
-                </a:solidFill>
-              </a:rPr>
-              <a:t>Chongxian</a:t>
-            </a:r>
-            <a:r>
-              <a:rPr lang="en-US" sz="3000" dirty="0">
-                <a:solidFill>
-                  <a:schemeClr val="bg1"/>
-                </a:solidFill>
-              </a:rPr>
-              <a:t>, Jake can work on pretty printing the bracket, which Alex will help with. Future machine learning modules similar to this one will want to have a better way for users to select college basketball statistics. Additionally, the developers of such modules may wish to have prior machine learning experience, a more proper mode of communication, and a more rigid implementation schedule in order to allow for time at the end to polish each component of the module separately.</a:t>
+              <a:t>, the developers of such modules may wish to have prior machine learning experience, a more proper mode of communication, and a more rigid implementation schedule in order to allow for time at the end to polish each component of the module separately.</a:t>
             </a:r>
           </a:p>
         </p:txBody>
@@ -5389,7 +5637,7 @@
           <p:nvPr/>
         </p:nvPicPr>
         <p:blipFill>
-          <a:blip r:embed="rId3">
+          <a:blip r:embed="rId4">
             <a:extLst>
               <a:ext uri="{28A0092B-C50C-407E-A947-70E740481C1C}">
                 <a14:useLocalDpi xmlns:a14="http://schemas.microsoft.com/office/drawing/2010/main" val="0"/>
@@ -5402,7 +5650,7 @@
         </p:blipFill>
         <p:spPr>
           <a:xfrm>
-            <a:off x="1566187" y="25161958"/>
+            <a:off x="1435559" y="25259929"/>
             <a:ext cx="8549640" cy="6047739"/>
           </a:xfrm>
           <a:prstGeom prst="rect">
@@ -5410,63 +5658,50 @@
           </a:prstGeom>
         </p:spPr>
       </p:pic>
-      <p:pic>
-        <p:nvPicPr>
-          <p:cNvPr id="5" name="Picture 4"/>
-          <p:cNvPicPr>
-            <a:picLocks noChangeAspect="1"/>
-          </p:cNvPicPr>
+      <p:sp>
+        <p:nvSpPr>
+          <p:cNvPr id="18" name="TextBox 17"/>
+          <p:cNvSpPr txBox="1"/>
           <p:nvPr/>
-        </p:nvPicPr>
-        <p:blipFill>
-          <a:blip r:embed="rId4"/>
-          <a:stretch>
-            <a:fillRect/>
-          </a:stretch>
-        </p:blipFill>
+        </p:nvSpPr>
         <p:spPr>
           <a:xfrm>
-            <a:off x="12468969" y="5991542"/>
-            <a:ext cx="9222474" cy="6047739"/>
+            <a:off x="12881113" y="12112215"/>
+            <a:ext cx="8030817" cy="1477328"/>
           </a:xfrm>
           <a:prstGeom prst="rect">
             <a:avLst/>
           </a:prstGeom>
+          <a:noFill/>
         </p:spPr>
-      </p:pic>
-      <p:pic>
-        <p:nvPicPr>
-          <p:cNvPr id="9" name="Picture 8"/>
-          <p:cNvPicPr>
-            <a:picLocks noChangeAspect="1"/>
-          </p:cNvPicPr>
+        <p:txBody>
+          <a:bodyPr wrap="square" rtlCol="0">
+            <a:spAutoFit/>
+          </a:bodyPr>
+          <a:lstStyle/>
+          <a:p>
+            <a:pPr algn="ctr"/>
+            <a:r>
+              <a:rPr lang="en-US" sz="3000" i="1" dirty="0"/>
+              <a:t>Fig. 2: </a:t>
+            </a:r>
+            <a:r>
+              <a:rPr lang="en-US" sz="3000" dirty="0" smtClean="0"/>
+              <a:t>Menu where the user chooses a machine learning algorithm and stats to generate a bracket with.</a:t>
+            </a:r>
+            <a:endParaRPr lang="en-US" sz="3000" dirty="0"/>
+          </a:p>
+        </p:txBody>
+      </p:sp>
+      <p:sp>
+        <p:nvSpPr>
+          <p:cNvPr id="25" name="TextBox 24"/>
+          <p:cNvSpPr txBox="1"/>
           <p:nvPr/>
-        </p:nvPicPr>
-        <p:blipFill>
-          <a:blip r:embed="rId5"/>
-          <a:stretch>
-            <a:fillRect/>
-          </a:stretch>
-        </p:blipFill>
+        </p:nvSpPr>
         <p:spPr>
           <a:xfrm>
-            <a:off x="34493200" y="4218118"/>
-            <a:ext cx="7827264" cy="6047738"/>
-          </a:xfrm>
-          <a:prstGeom prst="rect">
-            <a:avLst/>
-          </a:prstGeom>
-        </p:spPr>
-      </p:pic>
-      <p:sp>
-        <p:nvSpPr>
-          <p:cNvPr id="18" name="TextBox 17"/>
-          <p:cNvSpPr txBox="1"/>
-          <p:nvPr/>
-        </p:nvSpPr>
-        <p:spPr>
-          <a:xfrm>
-            <a:off x="12881113" y="12177529"/>
+            <a:off x="1438808" y="31480896"/>
             <a:ext cx="8030817" cy="1015663"/>
           </a:xfrm>
           <a:prstGeom prst="rect">
@@ -5483,25 +5718,26 @@
             <a:pPr algn="ctr"/>
             <a:r>
               <a:rPr lang="en-US" sz="3000" i="1" dirty="0"/>
-              <a:t>Fig. 2: </a:t>
-            </a:r>
-            <a:r>
-              <a:rPr lang="en-US" sz="3000" dirty="0"/>
-              <a:t>Instructional page that informs users on how to use the machine learning module.</a:t>
-            </a:r>
-          </a:p>
-        </p:txBody>
-      </p:sp>
-      <p:sp>
-        <p:nvSpPr>
-          <p:cNvPr id="25" name="TextBox 24"/>
+              <a:t>Fig. 1: </a:t>
+            </a:r>
+            <a:r>
+              <a:rPr lang="en-US" sz="3000" dirty="0" smtClean="0"/>
+              <a:t>Home page of website that includes project information and a link to our module.</a:t>
+            </a:r>
+            <a:endParaRPr lang="en-US" sz="3000" dirty="0"/>
+          </a:p>
+        </p:txBody>
+      </p:sp>
+      <p:sp>
+        <p:nvSpPr>
+          <p:cNvPr id="32" name="TextBox 31"/>
           <p:cNvSpPr txBox="1"/>
           <p:nvPr/>
         </p:nvSpPr>
         <p:spPr>
           <a:xfrm>
-            <a:off x="1406151" y="31448239"/>
-            <a:ext cx="8030817" cy="1015663"/>
+            <a:off x="22198405" y="30765242"/>
+            <a:ext cx="9222475" cy="1938992"/>
           </a:xfrm>
           <a:prstGeom prst="rect">
             <a:avLst/>
@@ -5517,25 +5753,30 @@
             <a:pPr algn="ctr"/>
             <a:r>
               <a:rPr lang="en-US" sz="3000" i="1" dirty="0"/>
-              <a:t>Fig. 1: </a:t>
-            </a:r>
-            <a:r>
-              <a:rPr lang="en-US" sz="3000" dirty="0"/>
-              <a:t>Home page. The “Menu” button allows the user to navigate through the website.</a:t>
-            </a:r>
-          </a:p>
-        </p:txBody>
-      </p:sp>
-      <p:sp>
-        <p:nvSpPr>
-          <p:cNvPr id="32" name="TextBox 31"/>
+              <a:t>Fig. 3</a:t>
+            </a:r>
+            <a:r>
+              <a:rPr lang="en-US" sz="3000" i="1" dirty="0" smtClean="0"/>
+              <a:t>: </a:t>
+            </a:r>
+            <a:r>
+              <a:rPr lang="en-US" sz="3000" dirty="0" smtClean="0"/>
+              <a:t>Waiting screen while a bracket is being produced where points per game, field goals attempted per game, and 3-pointers per game are used by a Linear Logistic Regression algorithm</a:t>
+            </a:r>
+            <a:endParaRPr lang="en-US" sz="3000" dirty="0"/>
+          </a:p>
+        </p:txBody>
+      </p:sp>
+      <p:sp>
+        <p:nvSpPr>
+          <p:cNvPr id="33" name="TextBox 32"/>
           <p:cNvSpPr txBox="1"/>
           <p:nvPr/>
         </p:nvSpPr>
         <p:spPr>
           <a:xfrm>
-            <a:off x="22645759" y="30732585"/>
-            <a:ext cx="8030817" cy="1015663"/>
+            <a:off x="34493200" y="10608314"/>
+            <a:ext cx="8030817" cy="1477328"/>
           </a:xfrm>
           <a:prstGeom prst="rect">
             <a:avLst/>
@@ -5550,56 +5791,66 @@
           <a:p>
             <a:pPr algn="ctr"/>
             <a:r>
-              <a:rPr lang="en-US" sz="3000" i="1" dirty="0"/>
-              <a:t>Fig. 3: </a:t>
-            </a:r>
-            <a:r>
-              <a:rPr lang="en-US" sz="3000" dirty="0" smtClean="0"/>
-              <a:t>The March Madness bracket predicted by SVM RBF</a:t>
-            </a:r>
-            <a:endParaRPr lang="en-US" sz="3000" dirty="0"/>
-          </a:p>
-        </p:txBody>
-      </p:sp>
-      <p:sp>
-        <p:nvSpPr>
-          <p:cNvPr id="33" name="TextBox 32"/>
-          <p:cNvSpPr txBox="1"/>
-          <p:nvPr/>
-        </p:nvSpPr>
-        <p:spPr>
-          <a:xfrm>
-            <a:off x="34493200" y="10608314"/>
-            <a:ext cx="8030817" cy="1015663"/>
-          </a:xfrm>
-          <a:prstGeom prst="rect">
-            <a:avLst/>
-          </a:prstGeom>
-          <a:noFill/>
-        </p:spPr>
-        <p:txBody>
-          <a:bodyPr wrap="square" rtlCol="0">
-            <a:spAutoFit/>
-          </a:bodyPr>
-          <a:lstStyle/>
+              <a:rPr lang="en-US" sz="3000" i="1" dirty="0" smtClean="0">
+                <a:solidFill>
+                  <a:schemeClr val="bg1"/>
+                </a:solidFill>
+              </a:rPr>
+              <a:t>Fig</a:t>
+            </a:r>
+            <a:r>
+              <a:rPr lang="en-US" sz="3000" i="1" dirty="0">
+                <a:solidFill>
+                  <a:schemeClr val="bg1"/>
+                </a:solidFill>
+              </a:rPr>
+              <a:t>. </a:t>
+            </a:r>
+            <a:r>
+              <a:rPr lang="en-US" sz="3000" i="1" dirty="0" smtClean="0">
+                <a:solidFill>
+                  <a:schemeClr val="bg1"/>
+                </a:solidFill>
+              </a:rPr>
+              <a:t>4: A </a:t>
+            </a:r>
+            <a:r>
+              <a:rPr lang="en-US" sz="3000" i="1" dirty="0">
+                <a:solidFill>
+                  <a:schemeClr val="bg1"/>
+                </a:solidFill>
+              </a:rPr>
+              <a:t>March Madness bracket predicted by the SVM RBF </a:t>
+            </a:r>
+            <a:r>
+              <a:rPr lang="en-US" sz="3000" i="1" dirty="0" smtClean="0">
+                <a:solidFill>
+                  <a:schemeClr val="bg1"/>
+                </a:solidFill>
+              </a:rPr>
+              <a:t>algorithm.</a:t>
+            </a:r>
+            <a:endParaRPr lang="en-US" sz="3000" i="1" dirty="0">
+              <a:solidFill>
+                <a:schemeClr val="bg1"/>
+              </a:solidFill>
+            </a:endParaRPr>
+          </a:p>
           <a:p>
             <a:pPr algn="ctr"/>
             <a:r>
-              <a:rPr lang="en-US" sz="3000" i="1" dirty="0">
+              <a:rPr lang="en-US" sz="3000" i="1" dirty="0" smtClean="0">
                 <a:solidFill>
                   <a:schemeClr val="bg1"/>
                 </a:solidFill>
               </a:rPr>
-              <a:t>Fig. 4: </a:t>
-            </a:r>
-            <a:r>
-              <a:rPr lang="en-US" sz="3000" dirty="0">
-                <a:solidFill>
-                  <a:schemeClr val="bg1"/>
-                </a:solidFill>
-              </a:rPr>
-              <a:t>Module page that hosts the machine learning module.</a:t>
-            </a:r>
+              <a:t> </a:t>
+            </a:r>
+            <a:endParaRPr lang="en-US" sz="3000" dirty="0">
+              <a:solidFill>
+                <a:schemeClr val="bg1"/>
+              </a:solidFill>
+            </a:endParaRPr>
           </a:p>
         </p:txBody>
       </p:sp>
@@ -5612,7 +5863,7 @@
           <p:nvPr/>
         </p:nvPicPr>
         <p:blipFill>
-          <a:blip r:embed="rId6">
+          <a:blip r:embed="rId5">
             <a:extLst>
               <a:ext uri="{28A0092B-C50C-407E-A947-70E740481C1C}">
                 <a14:useLocalDpi xmlns:a14="http://schemas.microsoft.com/office/drawing/2010/main" val="0"/>
@@ -5625,8 +5876,32 @@
         </p:blipFill>
         <p:spPr>
           <a:xfrm>
-            <a:off x="22198405" y="23997392"/>
+            <a:off x="34144068" y="3884631"/>
             <a:ext cx="8525683" cy="6348913"/>
+          </a:xfrm>
+          <a:prstGeom prst="rect">
+            <a:avLst/>
+          </a:prstGeom>
+        </p:spPr>
+      </p:pic>
+      <p:pic>
+        <p:nvPicPr>
+          <p:cNvPr id="8" name="Picture 7"/>
+          <p:cNvPicPr>
+            <a:picLocks noChangeAspect="1"/>
+          </p:cNvPicPr>
+          <p:nvPr/>
+        </p:nvPicPr>
+        <p:blipFill>
+          <a:blip r:embed="rId6"/>
+          <a:stretch>
+            <a:fillRect/>
+          </a:stretch>
+        </p:blipFill>
+        <p:spPr>
+          <a:xfrm>
+            <a:off x="12448011" y="6221556"/>
+            <a:ext cx="9226296" cy="5941447"/>
           </a:xfrm>
           <a:prstGeom prst="rect">
             <a:avLst/>

</xml_diff>